<commit_message>
resolve Diego/ARM edits PS_6_10_15_stamps_by_WOP
</commit_message>
<xml_diff>
--- a/spring14/slidesS14/6042S14welcome.pptx
+++ b/spring14/slidesS14/6042S14welcome.pptx
@@ -5520,7 +5520,7 @@
         <p:spPr bwMode="auto">
           <a:xfrm>
             <a:off x="3891908" y="6611938"/>
-            <a:ext cx="1371953" cy="246221"/>
+            <a:ext cx="1252416" cy="246221"/>
           </a:xfrm>
           <a:prstGeom prst="rect">
             <a:avLst/>
@@ -5547,13 +5547,13 @@
               <a:rPr lang="en-US" sz="1000" baseline="0" dirty="0" smtClean="0">
                 <a:latin typeface="Comic Sans MS" pitchFamily="66" charset="0"/>
               </a:rPr>
-              <a:t>September 4</a:t>
+              <a:t>February 5</a:t>
             </a:r>
             <a:r>
               <a:rPr lang="en-US" sz="1000" dirty="0" smtClean="0">
                 <a:latin typeface="Comic Sans MS" pitchFamily="66" charset="0"/>
               </a:rPr>
-              <a:t>,  2013</a:t>
+              <a:t>,  2014</a:t>
             </a:r>
             <a:endParaRPr lang="en-US" sz="1000" dirty="0">
               <a:latin typeface="Comic Sans MS" pitchFamily="66" charset="0"/>
@@ -5611,7 +5611,7 @@
               <a:rPr lang="en-US" sz="1000" dirty="0" smtClean="0">
                 <a:latin typeface="Comic Sans MS" pitchFamily="66" charset="0"/>
               </a:rPr>
-              <a:t>2013 </a:t>
+              <a:t>2014 </a:t>
             </a:r>
             <a:endParaRPr lang="en-US" sz="1000" dirty="0">
               <a:latin typeface="Comic Sans MS" pitchFamily="66" charset="0"/>
@@ -6165,32 +6165,50 @@
               <a:defRPr/>
             </a:pPr>
             <a:r>
-              <a:rPr lang="en-US" b="1" u="sng" dirty="0" smtClean="0">
+              <a:rPr lang="en-US" sz="2400" b="1" u="sng" dirty="0">
                 <a:solidFill>
                   <a:srgbClr val="A0106D"/>
                 </a:solidFill>
                 <a:latin typeface="Courier New" pitchFamily="49" charset="0"/>
                 <a:cs typeface="Courier New" pitchFamily="49" charset="0"/>
               </a:rPr>
-              <a:t>http://courses.csail.mit.edu/6.042</a:t>
-            </a:r>
-            <a:endParaRPr lang="en-US" sz="2400" dirty="0" smtClean="0">
-              <a:solidFill>
-                <a:srgbClr val="0D05A7"/>
-              </a:solidFill>
-            </a:endParaRPr>
-          </a:p>
-          <a:p>
-            <a:pPr eaLnBrk="1" hangingPunct="1">
-              <a:defRPr/>
-            </a:pPr>
+              <a:t>https://</a:t>
+            </a:r>
+            <a:r>
+              <a:rPr lang="en-US" sz="2400" b="1" u="sng" dirty="0" err="1">
+                <a:solidFill>
+                  <a:srgbClr val="A0106D"/>
+                </a:solidFill>
+                <a:latin typeface="Courier New" pitchFamily="49" charset="0"/>
+                <a:cs typeface="Courier New" pitchFamily="49" charset="0"/>
+              </a:rPr>
+              <a:t>stellar.mit.edu</a:t>
+            </a:r>
+            <a:r>
+              <a:rPr lang="en-US" sz="2400" b="1" u="sng" dirty="0">
+                <a:solidFill>
+                  <a:srgbClr val="A0106D"/>
+                </a:solidFill>
+                <a:latin typeface="Courier New" pitchFamily="49" charset="0"/>
+                <a:cs typeface="Courier New" pitchFamily="49" charset="0"/>
+              </a:rPr>
+              <a:t>/S/course/6/sp14/6.042/</a:t>
+            </a:r>
             <a:r>
               <a:rPr lang="en-US" sz="6000" dirty="0" smtClean="0">
                 <a:solidFill>
                   <a:srgbClr val="0D05A7"/>
                 </a:solidFill>
               </a:rPr>
-              <a:t>WELCOME!</a:t>
+              <a:t>WELCOME</a:t>
+            </a:r>
+            <a:r>
+              <a:rPr lang="en-US" sz="6000" dirty="0" smtClean="0">
+                <a:solidFill>
+                  <a:srgbClr val="0D05A7"/>
+                </a:solidFill>
+              </a:rPr>
+              <a:t>!</a:t>
             </a:r>
           </a:p>
           <a:p>
@@ -6235,7 +6253,7 @@
           <a:graphicData uri="http://schemas.openxmlformats.org/presentationml/2006/ole">
             <mc:AlternateContent xmlns:mc="http://schemas.openxmlformats.org/markup-compatibility/2006">
               <mc:Choice xmlns:v="urn:schemas-microsoft-com:vml" Requires="v">
-                <p:oleObj spid="_x0000_s1113" name="Equation" r:id="rId4" imgW="914400" imgH="215640" progId="Equation.3">
+                <p:oleObj spid="_x0000_s1116" name="Equation" r:id="rId4" imgW="914400" imgH="215640" progId="Equation.3">
                   <p:embed/>
                 </p:oleObj>
               </mc:Choice>
@@ -6305,7 +6323,7 @@
           <a:graphicData uri="http://schemas.openxmlformats.org/presentationml/2006/ole">
             <mc:AlternateContent xmlns:mc="http://schemas.openxmlformats.org/markup-compatibility/2006">
               <mc:Choice xmlns:v="urn:schemas-microsoft-com:vml" Requires="v">
-                <p:oleObj spid="_x0000_s1114" name="Equation" r:id="rId6" imgW="914400" imgH="215640" progId="Equation.3">
+                <p:oleObj spid="_x0000_s1117" name="Equation" r:id="rId6" imgW="914400" imgH="215640" progId="Equation.3">
                   <p:embed/>
                 </p:oleObj>
               </mc:Choice>
@@ -6364,11 +6382,11 @@
   <p:clrMapOvr>
     <a:masterClrMapping/>
   </p:clrMapOvr>
-  <mc:AlternateContent xmlns:mc="http://schemas.openxmlformats.org/markup-compatibility/2006">
-    <mc:Choice xmlns:p14="http://schemas.microsoft.com/office/powerpoint/2010/main" Requires="p14">
+  <mc:AlternateContent xmlns:mc="http://schemas.openxmlformats.org/markup-compatibility/2006" xmlns:p14="http://schemas.microsoft.com/office/powerpoint/2010/main">
+    <mc:Choice Requires="p14">
       <p:transition p14:dur="0"/>
     </mc:Choice>
-    <mc:Fallback>
+    <mc:Fallback xmlns="">
       <p:transition xmlns:p14="http://schemas.microsoft.com/office/powerpoint/2010/main"/>
     </mc:Fallback>
   </mc:AlternateContent>
@@ -8909,7 +8927,7 @@
           <a:graphicData uri="http://schemas.openxmlformats.org/presentationml/2006/ole">
             <mc:AlternateContent xmlns:mc="http://schemas.openxmlformats.org/markup-compatibility/2006">
               <mc:Choice xmlns:v="urn:schemas-microsoft-com:vml" Requires="v">
-                <p:oleObj spid="_x0000_s150579" name="Equation" r:id="rId4" imgW="838200" imgH="241300" progId="Equation.DSMT4">
+                <p:oleObj spid="_x0000_s150581" name="Equation" r:id="rId4" imgW="838200" imgH="241300" progId="Equation.DSMT4">
                   <p:embed/>
                 </p:oleObj>
               </mc:Choice>
@@ -9855,7 +9873,7 @@
           <a:graphicData uri="http://schemas.openxmlformats.org/presentationml/2006/ole">
             <mc:AlternateContent xmlns:mc="http://schemas.openxmlformats.org/markup-compatibility/2006">
               <mc:Choice xmlns:v="urn:schemas-microsoft-com:vml" Requires="v">
-                <p:oleObj spid="_x0000_s6230" name="Equation" r:id="rId4" imgW="304560" imgH="139680" progId="Equation.DSMT4">
+                <p:oleObj spid="_x0000_s6233" name="Equation" r:id="rId4" imgW="304560" imgH="139680" progId="Equation.DSMT4">
                   <p:embed/>
                 </p:oleObj>
               </mc:Choice>
@@ -9925,7 +9943,7 @@
           <a:graphicData uri="http://schemas.openxmlformats.org/presentationml/2006/ole">
             <mc:AlternateContent xmlns:mc="http://schemas.openxmlformats.org/markup-compatibility/2006">
               <mc:Choice xmlns:v="urn:schemas-microsoft-com:vml" Requires="v">
-                <p:oleObj spid="_x0000_s6231" name="Equation" r:id="rId6" imgW="304560" imgH="139680" progId="Equation.DSMT4">
+                <p:oleObj spid="_x0000_s6234" name="Equation" r:id="rId6" imgW="304560" imgH="139680" progId="Equation.DSMT4">
                   <p:embed/>
                 </p:oleObj>
               </mc:Choice>
@@ -11351,7 +11369,7 @@
           <a:graphicData uri="http://schemas.openxmlformats.org/presentationml/2006/ole">
             <mc:AlternateContent xmlns:mc="http://schemas.openxmlformats.org/markup-compatibility/2006">
               <mc:Choice xmlns:v="urn:schemas-microsoft-com:vml" Requires="v">
-                <p:oleObj spid="_x0000_s7252" name="Equation" r:id="rId4" imgW="304560" imgH="139680" progId="Equation.DSMT4">
+                <p:oleObj spid="_x0000_s7255" name="Equation" r:id="rId4" imgW="304560" imgH="139680" progId="Equation.DSMT4">
                   <p:embed/>
                 </p:oleObj>
               </mc:Choice>
@@ -11421,7 +11439,7 @@
           <a:graphicData uri="http://schemas.openxmlformats.org/presentationml/2006/ole">
             <mc:AlternateContent xmlns:mc="http://schemas.openxmlformats.org/markup-compatibility/2006">
               <mc:Choice xmlns:v="urn:schemas-microsoft-com:vml" Requires="v">
-                <p:oleObj spid="_x0000_s7253" name="Equation" r:id="rId6" imgW="304560" imgH="139680" progId="Equation.DSMT4">
+                <p:oleObj spid="_x0000_s7256" name="Equation" r:id="rId6" imgW="304560" imgH="139680" progId="Equation.DSMT4">
                   <p:embed/>
                 </p:oleObj>
               </mc:Choice>
@@ -11855,32 +11873,50 @@
               <a:defRPr/>
             </a:pPr>
             <a:r>
-              <a:rPr lang="en-US" b="1" u="sng" dirty="0" smtClean="0">
+              <a:rPr lang="en-US" sz="2400" b="1" u="sng" dirty="0">
                 <a:solidFill>
                   <a:srgbClr val="A0106D"/>
                 </a:solidFill>
                 <a:latin typeface="Courier New" pitchFamily="49" charset="0"/>
                 <a:cs typeface="Courier New" pitchFamily="49" charset="0"/>
               </a:rPr>
-              <a:t>http://courses.csail.mit.edu/6.042</a:t>
-            </a:r>
-            <a:endParaRPr lang="en-US" sz="2400" dirty="0" smtClean="0">
-              <a:solidFill>
-                <a:srgbClr val="0D05A7"/>
-              </a:solidFill>
-            </a:endParaRPr>
-          </a:p>
-          <a:p>
-            <a:pPr eaLnBrk="1" hangingPunct="1">
-              <a:defRPr/>
-            </a:pPr>
+              <a:t>https://</a:t>
+            </a:r>
+            <a:r>
+              <a:rPr lang="en-US" sz="2400" b="1" u="sng" dirty="0" err="1">
+                <a:solidFill>
+                  <a:srgbClr val="A0106D"/>
+                </a:solidFill>
+                <a:latin typeface="Courier New" pitchFamily="49" charset="0"/>
+                <a:cs typeface="Courier New" pitchFamily="49" charset="0"/>
+              </a:rPr>
+              <a:t>stellar.mit.edu</a:t>
+            </a:r>
+            <a:r>
+              <a:rPr lang="en-US" sz="2400" b="1" u="sng" dirty="0">
+                <a:solidFill>
+                  <a:srgbClr val="A0106D"/>
+                </a:solidFill>
+                <a:latin typeface="Courier New" pitchFamily="49" charset="0"/>
+                <a:cs typeface="Courier New" pitchFamily="49" charset="0"/>
+              </a:rPr>
+              <a:t>/S/course/6/sp14/6.042/</a:t>
+            </a:r>
             <a:r>
               <a:rPr lang="en-US" sz="6000" dirty="0" smtClean="0">
                 <a:solidFill>
                   <a:srgbClr val="0D05A7"/>
                 </a:solidFill>
               </a:rPr>
-              <a:t>WELCOME!</a:t>
+              <a:t>WELCOME</a:t>
+            </a:r>
+            <a:r>
+              <a:rPr lang="en-US" sz="6000" dirty="0" smtClean="0">
+                <a:solidFill>
+                  <a:srgbClr val="0D05A7"/>
+                </a:solidFill>
+              </a:rPr>
+              <a:t>!</a:t>
             </a:r>
           </a:p>
           <a:p>
@@ -11931,7 +11967,7 @@
           <a:graphicData uri="http://schemas.openxmlformats.org/presentationml/2006/ole">
             <mc:AlternateContent xmlns:mc="http://schemas.openxmlformats.org/markup-compatibility/2006">
               <mc:Choice xmlns:v="urn:schemas-microsoft-com:vml" Requires="v">
-                <p:oleObj spid="_x0000_s194602" name="Equation" r:id="rId4" imgW="914400" imgH="215640" progId="Equation.3">
+                <p:oleObj spid="_x0000_s194605" name="Equation" r:id="rId4" imgW="914400" imgH="215640" progId="Equation.3">
                   <p:embed/>
                 </p:oleObj>
               </mc:Choice>
@@ -12001,7 +12037,7 @@
           <a:graphicData uri="http://schemas.openxmlformats.org/presentationml/2006/ole">
             <mc:AlternateContent xmlns:mc="http://schemas.openxmlformats.org/markup-compatibility/2006">
               <mc:Choice xmlns:v="urn:schemas-microsoft-com:vml" Requires="v">
-                <p:oleObj spid="_x0000_s194603" name="Equation" r:id="rId6" imgW="914400" imgH="215640" progId="Equation.3">
+                <p:oleObj spid="_x0000_s194606" name="Equation" r:id="rId6" imgW="914400" imgH="215640" progId="Equation.3">
                   <p:embed/>
                 </p:oleObj>
               </mc:Choice>
@@ -12172,7 +12208,7 @@
           <a:graphicData uri="http://schemas.openxmlformats.org/presentationml/2006/ole">
             <mc:AlternateContent xmlns:mc="http://schemas.openxmlformats.org/markup-compatibility/2006">
               <mc:Choice xmlns:v="urn:schemas-microsoft-com:vml" Requires="v">
-                <p:oleObj spid="_x0000_s209947" name="Equation" r:id="rId4" imgW="114120" imgH="177480" progId="Equation.DSMT4">
+                <p:oleObj spid="_x0000_s209950" name="Equation" r:id="rId4" imgW="114120" imgH="177480" progId="Equation.DSMT4">
                   <p:embed/>
                 </p:oleObj>
               </mc:Choice>
@@ -12777,7 +12813,7 @@
           <a:graphicData uri="http://schemas.openxmlformats.org/presentationml/2006/ole">
             <mc:AlternateContent xmlns:mc="http://schemas.openxmlformats.org/markup-compatibility/2006">
               <mc:Choice xmlns:v="urn:schemas-microsoft-com:vml" Requires="v">
-                <p:oleObj spid="_x0000_s209948" name="Equation" r:id="rId6" imgW="635000" imgH="469900" progId="Equation.DSMT4">
+                <p:oleObj spid="_x0000_s209951" name="Equation" r:id="rId6" imgW="635000" imgH="469900" progId="Equation.DSMT4">
                   <p:embed/>
                 </p:oleObj>
               </mc:Choice>
@@ -13005,7 +13041,7 @@
           <a:graphicData uri="http://schemas.openxmlformats.org/presentationml/2006/ole">
             <mc:AlternateContent xmlns:mc="http://schemas.openxmlformats.org/markup-compatibility/2006">
               <mc:Choice xmlns:v="urn:schemas-microsoft-com:vml" Requires="v">
-                <p:oleObj spid="_x0000_s187450" name="Equation" r:id="rId4" imgW="114120" imgH="177480" progId="Equation.DSMT4">
+                <p:oleObj spid="_x0000_s187453" name="Equation" r:id="rId4" imgW="114120" imgH="177480" progId="Equation.DSMT4">
                   <p:embed/>
                 </p:oleObj>
               </mc:Choice>
@@ -13684,7 +13720,7 @@
           <a:graphicData uri="http://schemas.openxmlformats.org/presentationml/2006/ole">
             <mc:AlternateContent xmlns:mc="http://schemas.openxmlformats.org/markup-compatibility/2006">
               <mc:Choice xmlns:v="urn:schemas-microsoft-com:vml" Requires="v">
-                <p:oleObj spid="_x0000_s187451" name="Equation" r:id="rId6" imgW="635000" imgH="444500" progId="Equation.DSMT4">
+                <p:oleObj spid="_x0000_s187454" name="Equation" r:id="rId6" imgW="635000" imgH="444500" progId="Equation.DSMT4">
                   <p:embed/>
                 </p:oleObj>
               </mc:Choice>
@@ -18868,7 +18904,7 @@
           <a:graphicData uri="http://schemas.openxmlformats.org/presentationml/2006/ole">
             <mc:AlternateContent xmlns:mc="http://schemas.openxmlformats.org/markup-compatibility/2006">
               <mc:Choice xmlns:v="urn:schemas-microsoft-com:vml" Requires="v">
-                <p:oleObj spid="_x0000_s9340" name="Equation" r:id="rId4" imgW="1257120" imgH="444240" progId="Equation.DSMT4">
+                <p:oleObj spid="_x0000_s9344" name="Equation" r:id="rId4" imgW="1257120" imgH="444240" progId="Equation.DSMT4">
                   <p:embed/>
                 </p:oleObj>
               </mc:Choice>
@@ -18963,7 +18999,7 @@
           <a:graphicData uri="http://schemas.openxmlformats.org/presentationml/2006/ole">
             <mc:AlternateContent xmlns:mc="http://schemas.openxmlformats.org/markup-compatibility/2006">
               <mc:Choice xmlns:v="urn:schemas-microsoft-com:vml" Requires="v">
-                <p:oleObj spid="_x0000_s9341" name="Equation" r:id="rId6" imgW="1269720" imgH="444240" progId="Equation.DSMT4">
+                <p:oleObj spid="_x0000_s9345" name="Equation" r:id="rId6" imgW="1269720" imgH="444240" progId="Equation.DSMT4">
                   <p:embed/>
                 </p:oleObj>
               </mc:Choice>
@@ -19136,7 +19172,7 @@
           <a:graphicData uri="http://schemas.openxmlformats.org/presentationml/2006/ole">
             <mc:AlternateContent xmlns:mc="http://schemas.openxmlformats.org/markup-compatibility/2006">
               <mc:Choice xmlns:v="urn:schemas-microsoft-com:vml" Requires="v">
-                <p:oleObj spid="_x0000_s9342" name="Equation" r:id="rId8" imgW="774360" imgH="203040" progId="Equation.DSMT4">
+                <p:oleObj spid="_x0000_s9346" name="Equation" r:id="rId8" imgW="774360" imgH="203040" progId="Equation.DSMT4">
                   <p:embed/>
                 </p:oleObj>
               </mc:Choice>
@@ -19728,7 +19764,7 @@
             <a:graphicData uri="http://schemas.openxmlformats.org/presentationml/2006/ole">
               <mc:AlternateContent xmlns:mc="http://schemas.openxmlformats.org/markup-compatibility/2006">
                 <mc:Choice xmlns:v="urn:schemas-microsoft-com:vml" Requires="v">
-                  <p:oleObj spid="_x0000_s10326" name="Equation" r:id="rId4" imgW="774360" imgH="203040" progId="Equation.DSMT4">
+                  <p:oleObj spid="_x0000_s10329" name="Equation" r:id="rId4" imgW="774360" imgH="203040" progId="Equation.DSMT4">
                     <p:embed/>
                   </p:oleObj>
                 </mc:Choice>
@@ -19893,7 +19929,7 @@
             <a:graphicData uri="http://schemas.openxmlformats.org/presentationml/2006/ole">
               <mc:AlternateContent xmlns:mc="http://schemas.openxmlformats.org/markup-compatibility/2006">
                 <mc:Choice xmlns:v="urn:schemas-microsoft-com:vml" Requires="v">
-                  <p:oleObj spid="_x0000_s10327" name="Equation" r:id="rId6" imgW="736560" imgH="203040" progId="Equation.DSMT4">
+                  <p:oleObj spid="_x0000_s10330" name="Equation" r:id="rId6" imgW="736560" imgH="203040" progId="Equation.DSMT4">
                     <p:embed/>
                   </p:oleObj>
                 </mc:Choice>
@@ -20719,7 +20755,7 @@
           <a:graphicData uri="http://schemas.openxmlformats.org/presentationml/2006/ole">
             <mc:AlternateContent xmlns:mc="http://schemas.openxmlformats.org/markup-compatibility/2006">
               <mc:Choice xmlns:v="urn:schemas-microsoft-com:vml" Requires="v">
-                <p:oleObj spid="_x0000_s11352" name="Equation" r:id="rId4" imgW="114120" imgH="177480" progId="Equation.DSMT4">
+                <p:oleObj spid="_x0000_s11355" name="Equation" r:id="rId4" imgW="114120" imgH="177480" progId="Equation.DSMT4">
                   <p:embed/>
                 </p:oleObj>
               </mc:Choice>
@@ -20789,7 +20825,7 @@
           <a:graphicData uri="http://schemas.openxmlformats.org/presentationml/2006/ole">
             <mc:AlternateContent xmlns:mc="http://schemas.openxmlformats.org/markup-compatibility/2006">
               <mc:Choice xmlns:v="urn:schemas-microsoft-com:vml" Requires="v">
-                <p:oleObj spid="_x0000_s11353" name="Equation" r:id="rId6" imgW="114120" imgH="177480" progId="Equation.DSMT4">
+                <p:oleObj spid="_x0000_s11356" name="Equation" r:id="rId6" imgW="114120" imgH="177480" progId="Equation.DSMT4">
                   <p:embed/>
                 </p:oleObj>
               </mc:Choice>
@@ -21673,7 +21709,7 @@
           <a:graphicData uri="http://schemas.openxmlformats.org/presentationml/2006/ole">
             <mc:AlternateContent xmlns:mc="http://schemas.openxmlformats.org/markup-compatibility/2006">
               <mc:Choice xmlns:v="urn:schemas-microsoft-com:vml" Requires="v">
-                <p:oleObj spid="_x0000_s184371" name="Equation" r:id="rId4" imgW="2552700" imgH="419100" progId="Equation.DSMT4">
+                <p:oleObj spid="_x0000_s184373" name="Equation" r:id="rId4" imgW="2552700" imgH="419100" progId="Equation.DSMT4">
                   <p:embed/>
                 </p:oleObj>
               </mc:Choice>
@@ -22233,7 +22269,7 @@
           <a:graphicData uri="http://schemas.openxmlformats.org/presentationml/2006/ole">
             <mc:AlternateContent xmlns:mc="http://schemas.openxmlformats.org/markup-compatibility/2006">
               <mc:Choice xmlns:v="urn:schemas-microsoft-com:vml" Requires="v">
-                <p:oleObj spid="_x0000_s140376" name="Equation" r:id="rId4" imgW="914400" imgH="215640" progId="Equation.3">
+                <p:oleObj spid="_x0000_s140379" name="Equation" r:id="rId4" imgW="914400" imgH="215640" progId="Equation.3">
                   <p:embed/>
                 </p:oleObj>
               </mc:Choice>
@@ -22303,7 +22339,7 @@
           <a:graphicData uri="http://schemas.openxmlformats.org/presentationml/2006/ole">
             <mc:AlternateContent xmlns:mc="http://schemas.openxmlformats.org/markup-compatibility/2006">
               <mc:Choice xmlns:v="urn:schemas-microsoft-com:vml" Requires="v">
-                <p:oleObj spid="_x0000_s140377" name="Equation" r:id="rId6" imgW="914400" imgH="215640" progId="Equation.3">
+                <p:oleObj spid="_x0000_s140380" name="Equation" r:id="rId6" imgW="914400" imgH="215640" progId="Equation.3">
                   <p:embed/>
                 </p:oleObj>
               </mc:Choice>
@@ -22430,8 +22466,8 @@
         </p:nvSpPr>
         <p:spPr bwMode="auto">
           <a:xfrm>
-            <a:off x="477838" y="1579561"/>
-            <a:ext cx="8188325" cy="4062651"/>
+            <a:off x="203200" y="1168400"/>
+            <a:ext cx="8826500" cy="4154983"/>
           </a:xfrm>
           <a:prstGeom prst="rect">
             <a:avLst/>
@@ -22445,7 +22481,7 @@
           </a:ln>
         </p:spPr>
         <p:txBody>
-          <a:bodyPr>
+          <a:bodyPr wrap="square">
             <a:spAutoFit/>
           </a:bodyPr>
           <a:lstStyle/>
@@ -22454,35 +22490,37 @@
               <a:defRPr/>
             </a:pPr>
             <a:r>
-              <a:rPr lang="en-US" sz="2800" b="1" u="sng" dirty="0">
+              <a:rPr lang="en-US" sz="2400" b="1" u="sng" kern="0" dirty="0">
                 <a:solidFill>
                   <a:srgbClr val="A0106D"/>
                 </a:solidFill>
                 <a:latin typeface="Courier New" pitchFamily="49" charset="0"/>
                 <a:cs typeface="Courier New" pitchFamily="49" charset="0"/>
-                <a:hlinkClick r:id="rId7"/>
-              </a:rPr>
-              <a:t>http://courses.csail.mit.edu/6.042</a:t>
-            </a:r>
-            <a:endParaRPr lang="en-US" sz="2800" b="1" dirty="0">
-              <a:solidFill>
-                <a:schemeClr val="accent1">
-                  <a:lumMod val="50000"/>
-                </a:schemeClr>
-              </a:solidFill>
-            </a:endParaRPr>
-          </a:p>
-          <a:p>
-            <a:pPr algn="l">
-              <a:spcBef>
-                <a:spcPts val="1200"/>
-              </a:spcBef>
-              <a:buFont typeface="Arial" pitchFamily="34" charset="0"/>
-              <a:buChar char="•"/>
-              <a:defRPr/>
-            </a:pPr>
-            <a:r>
-              <a:rPr lang="en-US" sz="4400" dirty="0">
+              </a:rPr>
+              <a:t>https://</a:t>
+            </a:r>
+            <a:r>
+              <a:rPr lang="en-US" sz="2400" b="1" u="sng" kern="0" dirty="0" err="1">
+                <a:solidFill>
+                  <a:srgbClr val="A0106D"/>
+                </a:solidFill>
+                <a:latin typeface="Courier New" pitchFamily="49" charset="0"/>
+                <a:cs typeface="Courier New" pitchFamily="49" charset="0"/>
+              </a:rPr>
+              <a:t>stellar.mit.edu</a:t>
+            </a:r>
+            <a:r>
+              <a:rPr lang="en-US" sz="2400" b="1" u="sng" kern="0" dirty="0">
+                <a:solidFill>
+                  <a:srgbClr val="A0106D"/>
+                </a:solidFill>
+                <a:latin typeface="Courier New" pitchFamily="49" charset="0"/>
+                <a:cs typeface="Courier New" pitchFamily="49" charset="0"/>
+              </a:rPr>
+              <a:t>/S/course/6/sp14/6.042/</a:t>
+            </a:r>
+            <a:r>
+              <a:rPr lang="en-US" sz="4400" dirty="0" smtClean="0">
                 <a:latin typeface="Comic Sans MS" pitchFamily="66" charset="0"/>
               </a:rPr>
               <a:t> </a:t>
@@ -22626,7 +22664,7 @@
                                         <p:tgtEl>
                                           <p:spTgt spid="5128">
                                             <p:txEl>
-                                              <p:pRg st="2" end="2"/>
+                                              <p:pRg st="1" end="1"/>
                                             </p:txEl>
                                           </p:spTgt>
                                         </p:tgtEl>
@@ -22675,7 +22713,7 @@
                                         <p:tgtEl>
                                           <p:spTgt spid="5128">
                                             <p:txEl>
-                                              <p:pRg st="3" end="3"/>
+                                              <p:pRg st="2" end="2"/>
                                             </p:txEl>
                                           </p:spTgt>
                                         </p:tgtEl>
@@ -22724,7 +22762,7 @@
                                         <p:tgtEl>
                                           <p:spTgt spid="5128">
                                             <p:txEl>
-                                              <p:pRg st="4" end="4"/>
+                                              <p:pRg st="3" end="3"/>
                                             </p:txEl>
                                           </p:spTgt>
                                         </p:tgtEl>
@@ -22773,7 +22811,7 @@
                                         <p:tgtEl>
                                           <p:spTgt spid="5128">
                                             <p:txEl>
-                                              <p:pRg st="5" end="5"/>
+                                              <p:pRg st="4" end="4"/>
                                             </p:txEl>
                                           </p:spTgt>
                                         </p:tgtEl>
@@ -22960,7 +22998,7 @@
           <a:graphicData uri="http://schemas.openxmlformats.org/presentationml/2006/ole">
             <mc:AlternateContent xmlns:mc="http://schemas.openxmlformats.org/markup-compatibility/2006">
               <mc:Choice xmlns:v="urn:schemas-microsoft-com:vml" Requires="v">
-                <p:oleObj spid="_x0000_s12340" name="Equation" r:id="rId4" imgW="2590560" imgH="368280" progId="Equation.DSMT4">
+                <p:oleObj spid="_x0000_s12342" name="Equation" r:id="rId4" imgW="2590560" imgH="368280" progId="Equation.DSMT4">
                   <p:embed/>
                 </p:oleObj>
               </mc:Choice>
@@ -23641,11 +23679,7 @@
             <a:pPr eaLnBrk="1" hangingPunct="1"/>
             <a:r>
               <a:rPr lang="en-US" dirty="0" smtClean="0"/>
-              <a:t>Consequences of  </a:t>
-            </a:r>
-            <a:r>
-              <a:rPr lang="en-US" dirty="0" smtClean="0"/>
-              <a:t>1 </a:t>
+              <a:t>Consequences of  1 </a:t>
             </a:r>
             <a:r>
               <a:rPr lang="en-US" dirty="0" smtClean="0">
@@ -23855,7 +23889,7 @@
           <a:graphicData uri="http://schemas.openxmlformats.org/presentationml/2006/ole">
             <mc:AlternateContent xmlns:mc="http://schemas.openxmlformats.org/markup-compatibility/2006">
               <mc:Choice xmlns:v="urn:schemas-microsoft-com:vml" Requires="v">
-                <p:oleObj spid="_x0000_s13364" name="Equation" r:id="rId4" imgW="152280" imgH="393480" progId="Equation.DSMT4">
+                <p:oleObj spid="_x0000_s13366" name="Equation" r:id="rId4" imgW="152280" imgH="393480" progId="Equation.DSMT4">
                   <p:embed/>
                 </p:oleObj>
               </mc:Choice>
@@ -23914,13 +23948,13 @@
   <p:clrMapOvr>
     <a:masterClrMapping/>
   </p:clrMapOvr>
-  <mc:AlternateContent xmlns:mc="http://schemas.openxmlformats.org/markup-compatibility/2006">
-    <mc:Choice xmlns:p14="http://schemas.microsoft.com/office/powerpoint/2010/main" Requires="p14">
+  <mc:AlternateContent xmlns:mc="http://schemas.openxmlformats.org/markup-compatibility/2006" xmlns:p14="http://schemas.microsoft.com/office/powerpoint/2010/main">
+    <mc:Choice Requires="p14">
       <p:transition spd="med" p14:dur="600">
         <p:fade thruBlk="1"/>
       </p:transition>
     </mc:Choice>
-    <mc:Fallback>
+    <mc:Fallback xmlns="">
       <p:transition xmlns:p14="http://schemas.microsoft.com/office/powerpoint/2010/main" spd="med">
         <p:fade thruBlk="1"/>
       </p:transition>
@@ -24381,11 +24415,7 @@
             <a:pPr eaLnBrk="1" hangingPunct="1"/>
             <a:r>
               <a:rPr lang="en-US" dirty="0" smtClean="0"/>
-              <a:t>Consequences of  </a:t>
-            </a:r>
-            <a:r>
-              <a:rPr lang="en-US" dirty="0" smtClean="0"/>
-              <a:t>1 </a:t>
+              <a:t>Consequences of  1 </a:t>
             </a:r>
             <a:r>
               <a:rPr lang="en-US" dirty="0" smtClean="0">
@@ -24654,7 +24684,7 @@
                   <a:schemeClr val="tx1"/>
                 </a:solidFill>
               </a:rPr>
-              <a:t>Online Tutor</a:t>
+              <a:t>6.042r</a:t>
             </a:r>
             <a:r>
               <a:rPr lang="en-US" b="0" dirty="0" smtClean="0">
@@ -24696,7 +24726,7 @@
           <a:graphicData uri="http://schemas.openxmlformats.org/presentationml/2006/ole">
             <mc:AlternateContent xmlns:mc="http://schemas.openxmlformats.org/markup-compatibility/2006">
               <mc:Choice xmlns:v="urn:schemas-microsoft-com:vml" Requires="v">
-                <p:oleObj spid="_x0000_s2141" name="Equation" r:id="rId4" imgW="914400" imgH="215640" progId="Equation.3">
+                <p:oleObj spid="_x0000_s2144" name="Equation" r:id="rId4" imgW="914400" imgH="215640" progId="Equation.3">
                   <p:embed/>
                 </p:oleObj>
               </mc:Choice>
@@ -24766,7 +24796,7 @@
           <a:graphicData uri="http://schemas.openxmlformats.org/presentationml/2006/ole">
             <mc:AlternateContent xmlns:mc="http://schemas.openxmlformats.org/markup-compatibility/2006">
               <mc:Choice xmlns:v="urn:schemas-microsoft-com:vml" Requires="v">
-                <p:oleObj spid="_x0000_s2142" name="Equation" r:id="rId6" imgW="914400" imgH="215640" progId="Equation.3">
+                <p:oleObj spid="_x0000_s2145" name="Equation" r:id="rId6" imgW="914400" imgH="215640" progId="Equation.3">
                   <p:embed/>
                 </p:oleObj>
               </mc:Choice>
@@ -26010,25 +26040,7 @@
               <a:rPr lang="en-US" sz="4800" dirty="0" smtClean="0">
                 <a:latin typeface="Comic Sans MS" pitchFamily="66" charset="0"/>
               </a:rPr>
-              <a:t> Text </a:t>
-            </a:r>
-            <a:r>
-              <a:rPr lang="en-US" sz="4800" dirty="0" smtClean="0">
-                <a:latin typeface="Comic Sans MS" pitchFamily="66" charset="0"/>
-              </a:rPr>
-              <a:t>Chapter </a:t>
-            </a:r>
-            <a:r>
-              <a:rPr lang="en-US" sz="4800" dirty="0" smtClean="0">
-                <a:latin typeface="Comic Sans MS" pitchFamily="66" charset="0"/>
-              </a:rPr>
-              <a:t>1 </a:t>
-            </a:r>
-            <a:r>
-              <a:rPr lang="en-US" sz="4800" dirty="0" smtClean="0">
-                <a:latin typeface="Comic Sans MS" pitchFamily="66" charset="0"/>
-              </a:rPr>
-              <a:t>for </a:t>
+              <a:t> Text Chapter 1 for </a:t>
             </a:r>
             <a:r>
               <a:rPr lang="en-US" sz="4800" dirty="0" smtClean="0">
@@ -26050,19 +26062,7 @@
               <a:rPr lang="en-US" sz="4800" dirty="0" smtClean="0">
                 <a:latin typeface="Comic Sans MS" pitchFamily="66" charset="0"/>
               </a:rPr>
-              <a:t> </a:t>
-            </a:r>
-            <a:r>
-              <a:rPr lang="en-US" sz="4800" dirty="0" smtClean="0">
-                <a:latin typeface="Comic Sans MS" pitchFamily="66" charset="0"/>
-              </a:rPr>
-              <a:t> </a:t>
-            </a:r>
-            <a:r>
-              <a:rPr lang="en-US" sz="4800" dirty="0" smtClean="0">
-                <a:latin typeface="Comic Sans MS" pitchFamily="66" charset="0"/>
-              </a:rPr>
-              <a:t>slide </a:t>
+              <a:t>  slide </a:t>
             </a:r>
             <a:r>
               <a:rPr lang="en-US" sz="4800" dirty="0">
@@ -26236,7 +26236,7 @@
           <a:graphicData uri="http://schemas.openxmlformats.org/presentationml/2006/ole">
             <mc:AlternateContent xmlns:mc="http://schemas.openxmlformats.org/markup-compatibility/2006">
               <mc:Choice xmlns:v="urn:schemas-microsoft-com:vml" Requires="v">
-                <p:oleObj spid="_x0000_s3164" name="Equation" r:id="rId4" imgW="914400" imgH="215640" progId="Equation.3">
+                <p:oleObj spid="_x0000_s3167" name="Equation" r:id="rId4" imgW="914400" imgH="215640" progId="Equation.3">
                   <p:embed/>
                 </p:oleObj>
               </mc:Choice>
@@ -26306,7 +26306,7 @@
           <a:graphicData uri="http://schemas.openxmlformats.org/presentationml/2006/ole">
             <mc:AlternateContent xmlns:mc="http://schemas.openxmlformats.org/markup-compatibility/2006">
               <mc:Choice xmlns:v="urn:schemas-microsoft-com:vml" Requires="v">
-                <p:oleObj spid="_x0000_s3165" name="Equation" r:id="rId6" imgW="914400" imgH="215640" progId="Equation.3">
+                <p:oleObj spid="_x0000_s3168" name="Equation" r:id="rId6" imgW="914400" imgH="215640" progId="Equation.3">
                   <p:embed/>
                 </p:oleObj>
               </mc:Choice>
@@ -26760,11 +26760,7 @@
             </a:r>
             <a:r>
               <a:rPr lang="en-US" sz="4000" dirty="0" smtClean="0"/>
-              <a:t> most Mondays 15 min</a:t>
-            </a:r>
-            <a:r>
-              <a:rPr lang="en-US" sz="4000" dirty="0" smtClean="0"/>
-              <a:t>.</a:t>
+              <a:t> most Mondays 15 min.</a:t>
             </a:r>
           </a:p>
           <a:p>
@@ -26796,7 +26792,6 @@
               <a:rPr lang="en-US" sz="4000" dirty="0" smtClean="0"/>
               <a:t>.</a:t>
             </a:r>
-            <a:endParaRPr lang="en-US" sz="4000" dirty="0" smtClean="0"/>
           </a:p>
           <a:p>
             <a:r>
@@ -26845,11 +26840,7 @@
             </a:r>
             <a:r>
               <a:rPr lang="en-US" sz="4000" dirty="0" smtClean="0"/>
-              <a:t> </a:t>
-            </a:r>
-            <a:r>
-              <a:rPr lang="en-US" sz="4000" dirty="0" smtClean="0"/>
-              <a:t>due most days</a:t>
+              <a:t> due most days</a:t>
             </a:r>
           </a:p>
           <a:p>
@@ -26863,11 +26854,7 @@
             </a:r>
             <a:r>
               <a:rPr lang="en-US" sz="4000" dirty="0" smtClean="0"/>
-              <a:t>, </a:t>
-            </a:r>
-            <a:r>
-              <a:rPr lang="en-US" sz="4000" dirty="0" smtClean="0"/>
-              <a:t>1 </a:t>
+              <a:t>, 1 </a:t>
             </a:r>
             <a:r>
               <a:rPr lang="en-US" sz="4000" dirty="0"/>

</xml_diff>

<commit_message>
resolve PS_6_10_15_stamps_by_WOP, edit 6042S14welcome.pptx
</commit_message>
<xml_diff>
--- a/spring14/slidesS14/6042S14welcome.pptx
+++ b/spring14/slidesS14/6042S14welcome.pptx
@@ -6253,7 +6253,7 @@
           <a:graphicData uri="http://schemas.openxmlformats.org/presentationml/2006/ole">
             <mc:AlternateContent xmlns:mc="http://schemas.openxmlformats.org/markup-compatibility/2006">
               <mc:Choice xmlns:v="urn:schemas-microsoft-com:vml" Requires="v">
-                <p:oleObj spid="_x0000_s1116" name="Equation" r:id="rId4" imgW="914400" imgH="215640" progId="Equation.3">
+                <p:oleObj spid="_x0000_s1130" name="Equation" r:id="rId4" imgW="914400" imgH="215640" progId="Equation.3">
                   <p:embed/>
                 </p:oleObj>
               </mc:Choice>
@@ -6323,7 +6323,7 @@
           <a:graphicData uri="http://schemas.openxmlformats.org/presentationml/2006/ole">
             <mc:AlternateContent xmlns:mc="http://schemas.openxmlformats.org/markup-compatibility/2006">
               <mc:Choice xmlns:v="urn:schemas-microsoft-com:vml" Requires="v">
-                <p:oleObj spid="_x0000_s1117" name="Equation" r:id="rId6" imgW="914400" imgH="215640" progId="Equation.3">
+                <p:oleObj spid="_x0000_s1131" name="Equation" r:id="rId6" imgW="914400" imgH="215640" progId="Equation.3">
                   <p:embed/>
                 </p:oleObj>
               </mc:Choice>
@@ -6382,12 +6382,12 @@
   <p:clrMapOvr>
     <a:masterClrMapping/>
   </p:clrMapOvr>
-  <mc:AlternateContent xmlns:mc="http://schemas.openxmlformats.org/markup-compatibility/2006" xmlns:p14="http://schemas.microsoft.com/office/powerpoint/2010/main">
-    <mc:Choice Requires="p14">
-      <p:transition p14:dur="0"/>
+  <mc:AlternateContent xmlns:mc="http://schemas.openxmlformats.org/markup-compatibility/2006">
+    <mc:Choice xmlns:p14="http://schemas.microsoft.com/office/powerpoint/2010/main" Requires="p14">
+      <p:transition p14:dur="0" advClick="0"/>
     </mc:Choice>
-    <mc:Fallback xmlns="">
-      <p:transition xmlns:p14="http://schemas.microsoft.com/office/powerpoint/2010/main"/>
+    <mc:Fallback>
+      <p:transition xmlns:p14="http://schemas.microsoft.com/office/powerpoint/2010/main" advClick="0"/>
     </mc:Fallback>
   </mc:AlternateContent>
   <p:timing>
@@ -6493,8 +6493,8 @@
         </p:nvSpPr>
         <p:spPr bwMode="auto">
           <a:xfrm>
-            <a:off x="645855" y="2137926"/>
-            <a:ext cx="7830066" cy="2585323"/>
+            <a:off x="645855" y="1795026"/>
+            <a:ext cx="7830066" cy="3416320"/>
           </a:xfrm>
           <a:prstGeom prst="rect">
             <a:avLst/>
@@ -6542,17 +6542,26 @@
               <a:buChar char="•"/>
             </a:pPr>
             <a:r>
+              <a:rPr lang="en-US" sz="5400" dirty="0" smtClean="0">
+                <a:latin typeface="Comic Sans MS" pitchFamily="66" charset="0"/>
+              </a:rPr>
+              <a:t>5-10 </a:t>
+            </a:r>
+            <a:r>
               <a:rPr lang="en-US" sz="5400" dirty="0">
                 <a:latin typeface="Comic Sans MS" pitchFamily="66" charset="0"/>
               </a:rPr>
-              <a:t>initial 5 min </a:t>
+              <a:t>min </a:t>
             </a:r>
             <a:r>
               <a:rPr lang="en-US" sz="5400" dirty="0" smtClean="0">
                 <a:latin typeface="Comic Sans MS" pitchFamily="66" charset="0"/>
               </a:rPr>
-              <a:t>overview</a:t>
-            </a:r>
+              <a:t>overview by team coach, then</a:t>
+            </a:r>
+            <a:endParaRPr lang="en-US" sz="5400" dirty="0" smtClean="0">
+              <a:latin typeface="Comic Sans MS" pitchFamily="66" charset="0"/>
+            </a:endParaRPr>
           </a:p>
           <a:p>
             <a:pPr marL="685800" indent="-685800" algn="l">
@@ -6591,7 +6600,152 @@
   <p:timing>
     <p:tnLst>
       <p:par>
-        <p:cTn xmlns:p14="http://schemas.microsoft.com/office/powerpoint/2010/main" id="1" dur="indefinite" restart="never" nodeType="tmRoot"/>
+        <p:cTn xmlns:p14="http://schemas.microsoft.com/office/powerpoint/2010/main" id="1" dur="indefinite" restart="never" nodeType="tmRoot">
+          <p:childTnLst>
+            <p:seq concurrent="1" nextAc="seek">
+              <p:cTn id="2" dur="indefinite" nodeType="mainSeq">
+                <p:childTnLst>
+                  <p:par>
+                    <p:cTn id="3" fill="hold">
+                      <p:stCondLst>
+                        <p:cond delay="indefinite"/>
+                      </p:stCondLst>
+                      <p:childTnLst>
+                        <p:par>
+                          <p:cTn id="4" fill="hold">
+                            <p:stCondLst>
+                              <p:cond delay="0"/>
+                            </p:stCondLst>
+                            <p:childTnLst>
+                              <p:par>
+                                <p:cTn id="5" presetID="9" presetClass="entr" presetSubtype="0" fill="hold" nodeType="clickEffect">
+                                  <p:stCondLst>
+                                    <p:cond delay="0"/>
+                                  </p:stCondLst>
+                                  <p:childTnLst>
+                                    <p:set>
+                                      <p:cBhvr>
+                                        <p:cTn id="6" dur="1" fill="hold">
+                                          <p:stCondLst>
+                                            <p:cond delay="0"/>
+                                          </p:stCondLst>
+                                        </p:cTn>
+                                        <p:tgtEl>
+                                          <p:spTgt spid="24580">
+                                            <p:txEl>
+                                              <p:pRg st="1" end="1"/>
+                                            </p:txEl>
+                                          </p:spTgt>
+                                        </p:tgtEl>
+                                        <p:attrNameLst>
+                                          <p:attrName>style.visibility</p:attrName>
+                                        </p:attrNameLst>
+                                      </p:cBhvr>
+                                      <p:to>
+                                        <p:strVal val="visible"/>
+                                      </p:to>
+                                    </p:set>
+                                    <p:animEffect transition="in" filter="dissolve">
+                                      <p:cBhvr>
+                                        <p:cTn id="7" dur="500"/>
+                                        <p:tgtEl>
+                                          <p:spTgt spid="24580">
+                                            <p:txEl>
+                                              <p:pRg st="1" end="1"/>
+                                            </p:txEl>
+                                          </p:spTgt>
+                                        </p:tgtEl>
+                                      </p:cBhvr>
+                                    </p:animEffect>
+                                  </p:childTnLst>
+                                </p:cTn>
+                              </p:par>
+                            </p:childTnLst>
+                          </p:cTn>
+                        </p:par>
+                      </p:childTnLst>
+                    </p:cTn>
+                  </p:par>
+                  <p:par>
+                    <p:cTn id="8" fill="hold">
+                      <p:stCondLst>
+                        <p:cond delay="indefinite"/>
+                      </p:stCondLst>
+                      <p:childTnLst>
+                        <p:par>
+                          <p:cTn id="9" fill="hold">
+                            <p:stCondLst>
+                              <p:cond delay="0"/>
+                            </p:stCondLst>
+                            <p:childTnLst>
+                              <p:par>
+                                <p:cTn id="10" presetID="9" presetClass="entr" presetSubtype="0" fill="hold" nodeType="clickEffect">
+                                  <p:stCondLst>
+                                    <p:cond delay="0"/>
+                                  </p:stCondLst>
+                                  <p:childTnLst>
+                                    <p:set>
+                                      <p:cBhvr>
+                                        <p:cTn id="11" dur="1" fill="hold">
+                                          <p:stCondLst>
+                                            <p:cond delay="0"/>
+                                          </p:stCondLst>
+                                        </p:cTn>
+                                        <p:tgtEl>
+                                          <p:spTgt spid="24580">
+                                            <p:txEl>
+                                              <p:pRg st="2" end="2"/>
+                                            </p:txEl>
+                                          </p:spTgt>
+                                        </p:tgtEl>
+                                        <p:attrNameLst>
+                                          <p:attrName>style.visibility</p:attrName>
+                                        </p:attrNameLst>
+                                      </p:cBhvr>
+                                      <p:to>
+                                        <p:strVal val="visible"/>
+                                      </p:to>
+                                    </p:set>
+                                    <p:animEffect transition="in" filter="dissolve">
+                                      <p:cBhvr>
+                                        <p:cTn id="12" dur="500"/>
+                                        <p:tgtEl>
+                                          <p:spTgt spid="24580">
+                                            <p:txEl>
+                                              <p:pRg st="2" end="2"/>
+                                            </p:txEl>
+                                          </p:spTgt>
+                                        </p:tgtEl>
+                                      </p:cBhvr>
+                                    </p:animEffect>
+                                  </p:childTnLst>
+                                </p:cTn>
+                              </p:par>
+                            </p:childTnLst>
+                          </p:cTn>
+                        </p:par>
+                      </p:childTnLst>
+                    </p:cTn>
+                  </p:par>
+                </p:childTnLst>
+              </p:cTn>
+              <p:prevCondLst>
+                <p:cond evt="onPrev" delay="0">
+                  <p:tgtEl>
+                    <p:sldTgt/>
+                  </p:tgtEl>
+                </p:cond>
+              </p:prevCondLst>
+              <p:nextCondLst>
+                <p:cond evt="onNext" delay="0">
+                  <p:tgtEl>
+                    <p:sldTgt/>
+                  </p:tgtEl>
+                </p:cond>
+              </p:nextCondLst>
+            </p:seq>
+          </p:childTnLst>
+        </p:cTn>
       </p:par>
     </p:tnLst>
   </p:timing>
@@ -6820,7 +6974,7 @@
   <p:clrMapOvr>
     <a:masterClrMapping/>
   </p:clrMapOvr>
-  <p:transition xmlns:p14="http://schemas.microsoft.com/office/powerpoint/2010/main" spd="slow">
+  <p:transition xmlns:p14="http://schemas.microsoft.com/office/powerpoint/2010/main" spd="slow" advClick="0">
     <p:fade/>
   </p:transition>
   <p:timing>
@@ -6844,7 +6998,7 @@
                             </p:stCondLst>
                             <p:childTnLst>
                               <p:par>
-                                <p:cTn id="5" presetID="1" presetClass="entr" presetSubtype="0" fill="hold" grpId="0" nodeType="clickEffect">
+                                <p:cTn id="5" presetID="9" presetClass="entr" presetSubtype="0" fill="hold" grpId="0" nodeType="clickEffect">
                                   <p:stCondLst>
                                     <p:cond delay="0"/>
                                   </p:stCondLst>
@@ -6871,6 +7025,18 @@
                                         <p:strVal val="visible"/>
                                       </p:to>
                                     </p:set>
+                                    <p:animEffect transition="in" filter="dissolve">
+                                      <p:cBhvr>
+                                        <p:cTn id="7" dur="500"/>
+                                        <p:tgtEl>
+                                          <p:spTgt spid="4">
+                                            <p:txEl>
+                                              <p:pRg st="1" end="1"/>
+                                            </p:txEl>
+                                          </p:spTgt>
+                                        </p:tgtEl>
+                                      </p:cBhvr>
+                                    </p:animEffect>
                                   </p:childTnLst>
                                 </p:cTn>
                               </p:par>
@@ -6881,26 +7047,26 @@
                     </p:cTn>
                   </p:par>
                   <p:par>
-                    <p:cTn id="7" fill="hold">
+                    <p:cTn id="8" fill="hold">
                       <p:stCondLst>
                         <p:cond delay="indefinite"/>
                       </p:stCondLst>
                       <p:childTnLst>
                         <p:par>
-                          <p:cTn id="8" fill="hold">
+                          <p:cTn id="9" fill="hold">
                             <p:stCondLst>
                               <p:cond delay="0"/>
                             </p:stCondLst>
                             <p:childTnLst>
                               <p:par>
-                                <p:cTn id="9" presetID="1" presetClass="entr" presetSubtype="0" fill="hold" grpId="0" nodeType="clickEffect">
+                                <p:cTn id="10" presetID="9" presetClass="entr" presetSubtype="0" fill="hold" grpId="0" nodeType="clickEffect">
                                   <p:stCondLst>
                                     <p:cond delay="0"/>
                                   </p:stCondLst>
                                   <p:childTnLst>
                                     <p:set>
                                       <p:cBhvr>
-                                        <p:cTn id="10" dur="1" fill="hold">
+                                        <p:cTn id="11" dur="1" fill="hold">
                                           <p:stCondLst>
                                             <p:cond delay="0"/>
                                           </p:stCondLst>
@@ -6920,6 +7086,18 @@
                                         <p:strVal val="visible"/>
                                       </p:to>
                                     </p:set>
+                                    <p:animEffect transition="in" filter="dissolve">
+                                      <p:cBhvr>
+                                        <p:cTn id="12" dur="500"/>
+                                        <p:tgtEl>
+                                          <p:spTgt spid="4">
+                                            <p:txEl>
+                                              <p:pRg st="2" end="2"/>
+                                            </p:txEl>
+                                          </p:spTgt>
+                                        </p:tgtEl>
+                                      </p:cBhvr>
+                                    </p:animEffect>
                                   </p:childTnLst>
                                 </p:cTn>
                               </p:par>
@@ -6930,26 +7108,26 @@
                     </p:cTn>
                   </p:par>
                   <p:par>
-                    <p:cTn id="11" fill="hold">
+                    <p:cTn id="13" fill="hold">
                       <p:stCondLst>
                         <p:cond delay="indefinite"/>
                       </p:stCondLst>
                       <p:childTnLst>
                         <p:par>
-                          <p:cTn id="12" fill="hold">
+                          <p:cTn id="14" fill="hold">
                             <p:stCondLst>
                               <p:cond delay="0"/>
                             </p:stCondLst>
                             <p:childTnLst>
                               <p:par>
-                                <p:cTn id="13" presetID="1" presetClass="entr" presetSubtype="0" fill="hold" grpId="0" nodeType="clickEffect">
+                                <p:cTn id="15" presetID="9" presetClass="entr" presetSubtype="0" fill="hold" grpId="0" nodeType="clickEffect">
                                   <p:stCondLst>
                                     <p:cond delay="0"/>
                                   </p:stCondLst>
                                   <p:childTnLst>
                                     <p:set>
                                       <p:cBhvr>
-                                        <p:cTn id="14" dur="1" fill="hold">
+                                        <p:cTn id="16" dur="1" fill="hold">
                                           <p:stCondLst>
                                             <p:cond delay="0"/>
                                           </p:stCondLst>
@@ -6969,6 +7147,18 @@
                                         <p:strVal val="visible"/>
                                       </p:to>
                                     </p:set>
+                                    <p:animEffect transition="in" filter="dissolve">
+                                      <p:cBhvr>
+                                        <p:cTn id="17" dur="500"/>
+                                        <p:tgtEl>
+                                          <p:spTgt spid="4">
+                                            <p:txEl>
+                                              <p:pRg st="3" end="3"/>
+                                            </p:txEl>
+                                          </p:spTgt>
+                                        </p:tgtEl>
+                                      </p:cBhvr>
+                                    </p:animEffect>
                                   </p:childTnLst>
                                 </p:cTn>
                               </p:par>
@@ -6979,26 +7169,26 @@
                     </p:cTn>
                   </p:par>
                   <p:par>
-                    <p:cTn id="15" fill="hold">
+                    <p:cTn id="18" fill="hold">
                       <p:stCondLst>
                         <p:cond delay="indefinite"/>
                       </p:stCondLst>
                       <p:childTnLst>
                         <p:par>
-                          <p:cTn id="16" fill="hold">
+                          <p:cTn id="19" fill="hold">
                             <p:stCondLst>
                               <p:cond delay="0"/>
                             </p:stCondLst>
                             <p:childTnLst>
                               <p:par>
-                                <p:cTn id="17" presetID="1" presetClass="entr" presetSubtype="0" fill="hold" grpId="0" nodeType="clickEffect">
+                                <p:cTn id="20" presetID="9" presetClass="entr" presetSubtype="0" fill="hold" grpId="0" nodeType="clickEffect">
                                   <p:stCondLst>
                                     <p:cond delay="0"/>
                                   </p:stCondLst>
                                   <p:childTnLst>
                                     <p:set>
                                       <p:cBhvr>
-                                        <p:cTn id="18" dur="1" fill="hold">
+                                        <p:cTn id="21" dur="1" fill="hold">
                                           <p:stCondLst>
                                             <p:cond delay="0"/>
                                           </p:stCondLst>
@@ -7018,55 +7208,18 @@
                                         <p:strVal val="visible"/>
                                       </p:to>
                                     </p:set>
-                                  </p:childTnLst>
-                                </p:cTn>
-                              </p:par>
-                            </p:childTnLst>
-                          </p:cTn>
-                        </p:par>
-                      </p:childTnLst>
-                    </p:cTn>
-                  </p:par>
-                  <p:par>
-                    <p:cTn id="19" fill="hold">
-                      <p:stCondLst>
-                        <p:cond delay="indefinite"/>
-                      </p:stCondLst>
-                      <p:childTnLst>
-                        <p:par>
-                          <p:cTn id="20" fill="hold">
-                            <p:stCondLst>
-                              <p:cond delay="0"/>
-                            </p:stCondLst>
-                            <p:childTnLst>
-                              <p:par>
-                                <p:cTn id="21" presetID="1" presetClass="entr" presetSubtype="0" fill="hold" grpId="0" nodeType="clickEffect">
-                                  <p:stCondLst>
-                                    <p:cond delay="0"/>
-                                  </p:stCondLst>
-                                  <p:childTnLst>
-                                    <p:set>
+                                    <p:animEffect transition="in" filter="dissolve">
                                       <p:cBhvr>
-                                        <p:cTn id="22" dur="1" fill="hold">
-                                          <p:stCondLst>
-                                            <p:cond delay="0"/>
-                                          </p:stCondLst>
-                                        </p:cTn>
+                                        <p:cTn id="22" dur="500"/>
                                         <p:tgtEl>
                                           <p:spTgt spid="4">
                                             <p:txEl>
-                                              <p:pRg st="5" end="5"/>
+                                              <p:pRg st="4" end="4"/>
                                             </p:txEl>
                                           </p:spTgt>
                                         </p:tgtEl>
-                                        <p:attrNameLst>
-                                          <p:attrName>style.visibility</p:attrName>
-                                        </p:attrNameLst>
                                       </p:cBhvr>
-                                      <p:to>
-                                        <p:strVal val="visible"/>
-                                      </p:to>
-                                    </p:set>
+                                    </p:animEffect>
                                   </p:childTnLst>
                                 </p:cTn>
                               </p:par>
@@ -7089,7 +7242,7 @@
                             </p:stCondLst>
                             <p:childTnLst>
                               <p:par>
-                                <p:cTn id="25" presetID="15" presetClass="entr" presetSubtype="0" fill="hold" grpId="0" nodeType="clickEffect">
+                                <p:cTn id="25" presetID="9" presetClass="entr" presetSubtype="0" fill="hold" grpId="0" nodeType="clickEffect">
                                   <p:stCondLst>
                                     <p:cond delay="0"/>
                                   </p:stCondLst>
@@ -7097,6 +7250,67 @@
                                     <p:set>
                                       <p:cBhvr>
                                         <p:cTn id="26" dur="1" fill="hold">
+                                          <p:stCondLst>
+                                            <p:cond delay="0"/>
+                                          </p:stCondLst>
+                                        </p:cTn>
+                                        <p:tgtEl>
+                                          <p:spTgt spid="4">
+                                            <p:txEl>
+                                              <p:pRg st="5" end="5"/>
+                                            </p:txEl>
+                                          </p:spTgt>
+                                        </p:tgtEl>
+                                        <p:attrNameLst>
+                                          <p:attrName>style.visibility</p:attrName>
+                                        </p:attrNameLst>
+                                      </p:cBhvr>
+                                      <p:to>
+                                        <p:strVal val="visible"/>
+                                      </p:to>
+                                    </p:set>
+                                    <p:animEffect transition="in" filter="dissolve">
+                                      <p:cBhvr>
+                                        <p:cTn id="27" dur="500"/>
+                                        <p:tgtEl>
+                                          <p:spTgt spid="4">
+                                            <p:txEl>
+                                              <p:pRg st="5" end="5"/>
+                                            </p:txEl>
+                                          </p:spTgt>
+                                        </p:tgtEl>
+                                      </p:cBhvr>
+                                    </p:animEffect>
+                                  </p:childTnLst>
+                                </p:cTn>
+                              </p:par>
+                            </p:childTnLst>
+                          </p:cTn>
+                        </p:par>
+                      </p:childTnLst>
+                    </p:cTn>
+                  </p:par>
+                  <p:par>
+                    <p:cTn id="28" fill="hold">
+                      <p:stCondLst>
+                        <p:cond delay="indefinite"/>
+                      </p:stCondLst>
+                      <p:childTnLst>
+                        <p:par>
+                          <p:cTn id="29" fill="hold">
+                            <p:stCondLst>
+                              <p:cond delay="0"/>
+                            </p:stCondLst>
+                            <p:childTnLst>
+                              <p:par>
+                                <p:cTn id="30" presetID="9" presetClass="entr" presetSubtype="0" fill="hold" grpId="0" nodeType="clickEffect">
+                                  <p:stCondLst>
+                                    <p:cond delay="0"/>
+                                  </p:stCondLst>
+                                  <p:childTnLst>
+                                    <p:set>
+                                      <p:cBhvr>
+                                        <p:cTn id="31" dur="1" fill="hold">
                                           <p:stCondLst>
                                             <p:cond delay="0"/>
                                           </p:stCondLst>
@@ -7116,9 +7330,9 @@
                                         <p:strVal val="visible"/>
                                       </p:to>
                                     </p:set>
-                                    <p:anim calcmode="lin" valueType="num">
+                                    <p:animEffect transition="in" filter="dissolve">
                                       <p:cBhvr>
-                                        <p:cTn id="27" dur="1000" fill="hold"/>
+                                        <p:cTn id="32" dur="500"/>
                                         <p:tgtEl>
                                           <p:spTgt spid="4">
                                             <p:txEl>
@@ -7126,104 +7340,8 @@
                                             </p:txEl>
                                           </p:spTgt>
                                         </p:tgtEl>
-                                        <p:attrNameLst>
-                                          <p:attrName>ppt_w</p:attrName>
-                                        </p:attrNameLst>
                                       </p:cBhvr>
-                                      <p:tavLst>
-                                        <p:tav tm="0">
-                                          <p:val>
-                                            <p:fltVal val="0"/>
-                                          </p:val>
-                                        </p:tav>
-                                        <p:tav tm="100000">
-                                          <p:val>
-                                            <p:strVal val="#ppt_w"/>
-                                          </p:val>
-                                        </p:tav>
-                                      </p:tavLst>
-                                    </p:anim>
-                                    <p:anim calcmode="lin" valueType="num">
-                                      <p:cBhvr>
-                                        <p:cTn id="28" dur="1000" fill="hold"/>
-                                        <p:tgtEl>
-                                          <p:spTgt spid="4">
-                                            <p:txEl>
-                                              <p:pRg st="6" end="6"/>
-                                            </p:txEl>
-                                          </p:spTgt>
-                                        </p:tgtEl>
-                                        <p:attrNameLst>
-                                          <p:attrName>ppt_h</p:attrName>
-                                        </p:attrNameLst>
-                                      </p:cBhvr>
-                                      <p:tavLst>
-                                        <p:tav tm="0">
-                                          <p:val>
-                                            <p:fltVal val="0"/>
-                                          </p:val>
-                                        </p:tav>
-                                        <p:tav tm="100000">
-                                          <p:val>
-                                            <p:strVal val="#ppt_h"/>
-                                          </p:val>
-                                        </p:tav>
-                                      </p:tavLst>
-                                    </p:anim>
-                                    <p:anim calcmode="lin" valueType="num">
-                                      <p:cBhvr>
-                                        <p:cTn id="29" dur="1000" fill="hold"/>
-                                        <p:tgtEl>
-                                          <p:spTgt spid="4">
-                                            <p:txEl>
-                                              <p:pRg st="6" end="6"/>
-                                            </p:txEl>
-                                          </p:spTgt>
-                                        </p:tgtEl>
-                                        <p:attrNameLst>
-                                          <p:attrName>ppt_x</p:attrName>
-                                        </p:attrNameLst>
-                                      </p:cBhvr>
-                                      <p:tavLst>
-                                        <p:tav tm="0" fmla="#ppt_x+(cos(-2*pi*(1-$))*-#ppt_x-sin(-2*pi*(1-$))*(1-#ppt_y))*(1-$)">
-                                          <p:val>
-                                            <p:fltVal val="0"/>
-                                          </p:val>
-                                        </p:tav>
-                                        <p:tav tm="100000">
-                                          <p:val>
-                                            <p:fltVal val="1"/>
-                                          </p:val>
-                                        </p:tav>
-                                      </p:tavLst>
-                                    </p:anim>
-                                    <p:anim calcmode="lin" valueType="num">
-                                      <p:cBhvr>
-                                        <p:cTn id="30" dur="1000" fill="hold"/>
-                                        <p:tgtEl>
-                                          <p:spTgt spid="4">
-                                            <p:txEl>
-                                              <p:pRg st="6" end="6"/>
-                                            </p:txEl>
-                                          </p:spTgt>
-                                        </p:tgtEl>
-                                        <p:attrNameLst>
-                                          <p:attrName>ppt_y</p:attrName>
-                                        </p:attrNameLst>
-                                      </p:cBhvr>
-                                      <p:tavLst>
-                                        <p:tav tm="0" fmla="#ppt_y+(sin(-2*pi*(1-$))*-#ppt_x+cos(-2*pi*(1-$))*(1-#ppt_y))*(1-$)">
-                                          <p:val>
-                                            <p:fltVal val="0"/>
-                                          </p:val>
-                                        </p:tav>
-                                        <p:tav tm="100000">
-                                          <p:val>
-                                            <p:fltVal val="1"/>
-                                          </p:val>
-                                        </p:tav>
-                                      </p:tavLst>
-                                    </p:anim>
+                                    </p:animEffect>
                                   </p:childTnLst>
                                 </p:cTn>
                               </p:par>
@@ -7462,7 +7580,7 @@
             <a:r>
               <a:rPr lang="en-US" sz="4800" dirty="0" smtClean="0">
                 <a:solidFill>
-                  <a:srgbClr val="FF6600"/>
+                  <a:srgbClr val="CB21DD"/>
                 </a:solidFill>
                 <a:latin typeface="Comic Sans MS" pitchFamily="66" charset="0"/>
               </a:rPr>
@@ -7510,7 +7628,7 @@
   <p:clrMapOvr>
     <a:masterClrMapping/>
   </p:clrMapOvr>
-  <p:transition xmlns:p14="http://schemas.microsoft.com/office/powerpoint/2010/main" spd="slow">
+  <p:transition xmlns:p14="http://schemas.microsoft.com/office/powerpoint/2010/main" spd="slow" advClick="0">
     <p:fade/>
   </p:transition>
   <p:timing>
@@ -8044,7 +8162,19 @@
               <a:rPr lang="en-US" sz="6000" dirty="0" smtClean="0">
                 <a:latin typeface="Comic Sans MS" pitchFamily="66" charset="0"/>
               </a:rPr>
-              <a:t>Your TA/LA will be working to bring out the </a:t>
+              <a:t>Your </a:t>
+            </a:r>
+            <a:r>
+              <a:rPr lang="en-US" sz="6000" dirty="0" smtClean="0">
+                <a:latin typeface="Comic Sans MS" pitchFamily="66" charset="0"/>
+              </a:rPr>
+              <a:t>team coach </a:t>
+            </a:r>
+            <a:r>
+              <a:rPr lang="en-US" sz="6000" dirty="0" smtClean="0">
+                <a:latin typeface="Comic Sans MS" pitchFamily="66" charset="0"/>
+              </a:rPr>
+              <a:t>will be working to bring out the </a:t>
             </a:r>
             <a:r>
               <a:rPr lang="en-US" sz="6000" dirty="0" smtClean="0">
@@ -8094,7 +8224,7 @@
   <p:clrMapOvr>
     <a:masterClrMapping/>
   </p:clrMapOvr>
-  <p:transition xmlns:p14="http://schemas.microsoft.com/office/powerpoint/2010/main" spd="slow">
+  <p:transition xmlns:p14="http://schemas.microsoft.com/office/powerpoint/2010/main" spd="slow" advClick="0">
     <p:fade/>
   </p:transition>
   <p:timing>
@@ -8228,7 +8358,7 @@
   <p:clrMapOvr>
     <a:masterClrMapping/>
   </p:clrMapOvr>
-  <p:transition xmlns:p14="http://schemas.microsoft.com/office/powerpoint/2010/main" spd="slow">
+  <p:transition xmlns:p14="http://schemas.microsoft.com/office/powerpoint/2010/main" spd="slow" advClick="0">
     <p:fade/>
   </p:transition>
   <p:timing>
@@ -8365,7 +8495,7 @@
   <p:clrMapOvr>
     <a:masterClrMapping/>
   </p:clrMapOvr>
-  <p:transition xmlns:p14="http://schemas.microsoft.com/office/powerpoint/2010/main" spd="slow">
+  <p:transition xmlns:p14="http://schemas.microsoft.com/office/powerpoint/2010/main" spd="slow" advClick="0">
     <p:fade/>
   </p:transition>
   <p:timing>
@@ -8927,7 +9057,7 @@
           <a:graphicData uri="http://schemas.openxmlformats.org/presentationml/2006/ole">
             <mc:AlternateContent xmlns:mc="http://schemas.openxmlformats.org/markup-compatibility/2006">
               <mc:Choice xmlns:v="urn:schemas-microsoft-com:vml" Requires="v">
-                <p:oleObj spid="_x0000_s150581" name="Equation" r:id="rId4" imgW="838200" imgH="241300" progId="Equation.DSMT4">
+                <p:oleObj spid="_x0000_s150589" name="Equation" r:id="rId4" imgW="838200" imgH="241300" progId="Equation.DSMT4">
                   <p:embed/>
                 </p:oleObj>
               </mc:Choice>
@@ -9010,7 +9140,7 @@
                             </p:stCondLst>
                             <p:childTnLst>
                               <p:par>
-                                <p:cTn id="5" presetID="1" presetClass="entr" presetSubtype="0" fill="hold" nodeType="clickEffect">
+                                <p:cTn id="5" presetID="22" presetClass="entr" presetSubtype="8" fill="hold" nodeType="clickEffect">
                                   <p:stCondLst>
                                     <p:cond delay="0"/>
                                   </p:stCondLst>
@@ -9018,6 +9148,59 @@
                                     <p:set>
                                       <p:cBhvr>
                                         <p:cTn id="6" dur="1" fill="hold">
+                                          <p:stCondLst>
+                                            <p:cond delay="0"/>
+                                          </p:stCondLst>
+                                        </p:cTn>
+                                        <p:tgtEl>
+                                          <p:spTgt spid="18"/>
+                                        </p:tgtEl>
+                                        <p:attrNameLst>
+                                          <p:attrName>style.visibility</p:attrName>
+                                        </p:attrNameLst>
+                                      </p:cBhvr>
+                                      <p:to>
+                                        <p:strVal val="visible"/>
+                                      </p:to>
+                                    </p:set>
+                                    <p:animEffect transition="in" filter="wipe(left)">
+                                      <p:cBhvr>
+                                        <p:cTn id="7" dur="1000"/>
+                                        <p:tgtEl>
+                                          <p:spTgt spid="18"/>
+                                        </p:tgtEl>
+                                      </p:cBhvr>
+                                    </p:animEffect>
+                                  </p:childTnLst>
+                                </p:cTn>
+                              </p:par>
+                            </p:childTnLst>
+                          </p:cTn>
+                        </p:par>
+                      </p:childTnLst>
+                    </p:cTn>
+                  </p:par>
+                  <p:par>
+                    <p:cTn id="8" fill="hold">
+                      <p:stCondLst>
+                        <p:cond delay="indefinite"/>
+                      </p:stCondLst>
+                      <p:childTnLst>
+                        <p:par>
+                          <p:cTn id="9" fill="hold">
+                            <p:stCondLst>
+                              <p:cond delay="0"/>
+                            </p:stCondLst>
+                            <p:childTnLst>
+                              <p:par>
+                                <p:cTn id="10" presetID="1" presetClass="entr" presetSubtype="0" fill="hold" nodeType="clickEffect">
+                                  <p:stCondLst>
+                                    <p:cond delay="0"/>
+                                  </p:stCondLst>
+                                  <p:childTnLst>
+                                    <p:set>
+                                      <p:cBhvr>
+                                        <p:cTn id="11" dur="1" fill="hold">
                                           <p:stCondLst>
                                             <p:cond delay="0"/>
                                           </p:stCondLst>
@@ -9047,26 +9230,26 @@
                     </p:cTn>
                   </p:par>
                   <p:par>
-                    <p:cTn id="7" fill="hold">
+                    <p:cTn id="12" fill="hold">
                       <p:stCondLst>
                         <p:cond delay="indefinite"/>
                       </p:stCondLst>
                       <p:childTnLst>
                         <p:par>
-                          <p:cTn id="8" fill="hold">
+                          <p:cTn id="13" fill="hold">
                             <p:stCondLst>
                               <p:cond delay="0"/>
                             </p:stCondLst>
                             <p:childTnLst>
                               <p:par>
-                                <p:cTn id="9" presetID="1" presetClass="entr" presetSubtype="0" fill="hold" grpId="0" nodeType="clickEffect">
+                                <p:cTn id="14" presetID="9" presetClass="entr" presetSubtype="0" fill="hold" grpId="0" nodeType="clickEffect">
                                   <p:stCondLst>
                                     <p:cond delay="0"/>
                                   </p:stCondLst>
                                   <p:childTnLst>
                                     <p:set>
                                       <p:cBhvr>
-                                        <p:cTn id="10" dur="1" fill="hold">
+                                        <p:cTn id="15" dur="1" fill="hold">
                                           <p:stCondLst>
                                             <p:cond delay="0"/>
                                           </p:stCondLst>
@@ -9082,6 +9265,14 @@
                                         <p:strVal val="visible"/>
                                       </p:to>
                                     </p:set>
+                                    <p:animEffect transition="in" filter="dissolve">
+                                      <p:cBhvr>
+                                        <p:cTn id="16" dur="500"/>
+                                        <p:tgtEl>
+                                          <p:spTgt spid="8241"/>
+                                        </p:tgtEl>
+                                      </p:cBhvr>
+                                    </p:animEffect>
                                   </p:childTnLst>
                                 </p:cTn>
                               </p:par>
@@ -9092,26 +9283,26 @@
                     </p:cTn>
                   </p:par>
                   <p:par>
-                    <p:cTn id="11" fill="hold">
+                    <p:cTn id="17" fill="hold">
                       <p:stCondLst>
                         <p:cond delay="indefinite"/>
                       </p:stCondLst>
                       <p:childTnLst>
                         <p:par>
-                          <p:cTn id="12" fill="hold">
+                          <p:cTn id="18" fill="hold">
                             <p:stCondLst>
                               <p:cond delay="0"/>
                             </p:stCondLst>
                             <p:childTnLst>
                               <p:par>
-                                <p:cTn id="13" presetID="1" presetClass="entr" presetSubtype="0" fill="hold" nodeType="clickEffect">
+                                <p:cTn id="19" presetID="1" presetClass="entr" presetSubtype="0" fill="hold" nodeType="clickEffect">
                                   <p:stCondLst>
                                     <p:cond delay="0"/>
                                   </p:stCondLst>
                                   <p:childTnLst>
                                     <p:set>
                                       <p:cBhvr>
-                                        <p:cTn id="14" dur="1" fill="hold">
+                                        <p:cTn id="20" dur="1" fill="hold">
                                           <p:stCondLst>
                                             <p:cond delay="0"/>
                                           </p:stCondLst>
@@ -9141,26 +9332,26 @@
                     </p:cTn>
                   </p:par>
                   <p:par>
-                    <p:cTn id="15" fill="hold">
+                    <p:cTn id="21" fill="hold">
                       <p:stCondLst>
                         <p:cond delay="indefinite"/>
                       </p:stCondLst>
                       <p:childTnLst>
                         <p:par>
-                          <p:cTn id="16" fill="hold">
+                          <p:cTn id="22" fill="hold">
                             <p:stCondLst>
                               <p:cond delay="0"/>
                             </p:stCondLst>
                             <p:childTnLst>
                               <p:par>
-                                <p:cTn id="17" presetID="1" presetClass="entr" presetSubtype="0" fill="hold" grpId="0" nodeType="clickEffect">
+                                <p:cTn id="23" presetID="9" presetClass="entr" presetSubtype="0" fill="hold" grpId="0" nodeType="clickEffect">
                                   <p:stCondLst>
                                     <p:cond delay="0"/>
                                   </p:stCondLst>
                                   <p:childTnLst>
                                     <p:set>
                                       <p:cBhvr>
-                                        <p:cTn id="18" dur="1" fill="hold">
+                                        <p:cTn id="24" dur="1" fill="hold">
                                           <p:stCondLst>
                                             <p:cond delay="0"/>
                                           </p:stCondLst>
@@ -9176,6 +9367,14 @@
                                         <p:strVal val="visible"/>
                                       </p:to>
                                     </p:set>
+                                    <p:animEffect transition="in" filter="dissolve">
+                                      <p:cBhvr>
+                                        <p:cTn id="25" dur="500"/>
+                                        <p:tgtEl>
+                                          <p:spTgt spid="8242"/>
+                                        </p:tgtEl>
+                                      </p:cBhvr>
+                                    </p:animEffect>
                                   </p:childTnLst>
                                 </p:cTn>
                               </p:par>
@@ -9873,7 +10072,7 @@
           <a:graphicData uri="http://schemas.openxmlformats.org/presentationml/2006/ole">
             <mc:AlternateContent xmlns:mc="http://schemas.openxmlformats.org/markup-compatibility/2006">
               <mc:Choice xmlns:v="urn:schemas-microsoft-com:vml" Requires="v">
-                <p:oleObj spid="_x0000_s6233" name="Equation" r:id="rId4" imgW="304560" imgH="139680" progId="Equation.DSMT4">
+                <p:oleObj spid="_x0000_s6249" name="Equation" r:id="rId4" imgW="304560" imgH="139680" progId="Equation.DSMT4">
                   <p:embed/>
                 </p:oleObj>
               </mc:Choice>
@@ -9943,7 +10142,7 @@
           <a:graphicData uri="http://schemas.openxmlformats.org/presentationml/2006/ole">
             <mc:AlternateContent xmlns:mc="http://schemas.openxmlformats.org/markup-compatibility/2006">
               <mc:Choice xmlns:v="urn:schemas-microsoft-com:vml" Requires="v">
-                <p:oleObj spid="_x0000_s6234" name="Equation" r:id="rId6" imgW="304560" imgH="139680" progId="Equation.DSMT4">
+                <p:oleObj spid="_x0000_s6250" name="Equation" r:id="rId6" imgW="304560" imgH="139680" progId="Equation.DSMT4">
                   <p:embed/>
                 </p:oleObj>
               </mc:Choice>
@@ -10166,7 +10365,7 @@
                             </p:stCondLst>
                             <p:childTnLst>
                               <p:par>
-                                <p:cTn id="5" presetID="1" presetClass="entr" presetSubtype="0" fill="hold" grpId="0" nodeType="clickEffect">
+                                <p:cTn id="5" presetID="9" presetClass="entr" presetSubtype="0" fill="hold" grpId="0" nodeType="clickEffect">
                                   <p:stCondLst>
                                     <p:cond delay="0"/>
                                   </p:stCondLst>
@@ -10193,6 +10392,18 @@
                                         <p:strVal val="visible"/>
                                       </p:to>
                                     </p:set>
+                                    <p:animEffect transition="in" filter="dissolve">
+                                      <p:cBhvr>
+                                        <p:cTn id="7" dur="500"/>
+                                        <p:tgtEl>
+                                          <p:spTgt spid="9376">
+                                            <p:txEl>
+                                              <p:pRg st="0" end="0"/>
+                                            </p:txEl>
+                                          </p:spTgt>
+                                        </p:tgtEl>
+                                      </p:cBhvr>
+                                    </p:animEffect>
                                   </p:childTnLst>
                                 </p:cTn>
                               </p:par>
@@ -10203,26 +10414,26 @@
                     </p:cTn>
                   </p:par>
                   <p:par>
-                    <p:cTn id="7" fill="hold">
+                    <p:cTn id="8" fill="hold">
                       <p:stCondLst>
                         <p:cond delay="indefinite"/>
                       </p:stCondLst>
                       <p:childTnLst>
                         <p:par>
-                          <p:cTn id="8" fill="hold">
+                          <p:cTn id="9" fill="hold">
                             <p:stCondLst>
                               <p:cond delay="0"/>
                             </p:stCondLst>
                             <p:childTnLst>
                               <p:par>
-                                <p:cTn id="9" presetID="9" presetClass="entr" presetSubtype="0" fill="hold" grpId="0" nodeType="clickEffect">
+                                <p:cTn id="10" presetID="9" presetClass="entr" presetSubtype="0" fill="hold" grpId="0" nodeType="clickEffect">
                                   <p:stCondLst>
                                     <p:cond delay="0"/>
                                   </p:stCondLst>
                                   <p:childTnLst>
                                     <p:set>
                                       <p:cBhvr>
-                                        <p:cTn id="10" dur="1" fill="hold">
+                                        <p:cTn id="11" dur="1" fill="hold">
                                           <p:stCondLst>
                                             <p:cond delay="0"/>
                                           </p:stCondLst>
@@ -10244,7 +10455,7 @@
                                     </p:set>
                                     <p:animEffect transition="in" filter="dissolve">
                                       <p:cBhvr>
-                                        <p:cTn id="11" dur="500"/>
+                                        <p:cTn id="12" dur="500"/>
                                         <p:tgtEl>
                                           <p:spTgt spid="9376">
                                             <p:txEl>
@@ -10264,26 +10475,26 @@
                     </p:cTn>
                   </p:par>
                   <p:par>
-                    <p:cTn id="12" fill="hold">
+                    <p:cTn id="13" fill="hold">
                       <p:stCondLst>
                         <p:cond delay="indefinite"/>
                       </p:stCondLst>
                       <p:childTnLst>
                         <p:par>
-                          <p:cTn id="13" fill="hold">
+                          <p:cTn id="14" fill="hold">
                             <p:stCondLst>
                               <p:cond delay="0"/>
                             </p:stCondLst>
                             <p:childTnLst>
                               <p:par>
-                                <p:cTn id="14" presetID="9" presetClass="entr" presetSubtype="0" fill="hold" grpId="0" nodeType="clickEffect">
+                                <p:cTn id="15" presetID="9" presetClass="entr" presetSubtype="0" fill="hold" grpId="0" nodeType="clickEffect">
                                   <p:stCondLst>
                                     <p:cond delay="0"/>
                                   </p:stCondLst>
                                   <p:childTnLst>
                                     <p:set>
                                       <p:cBhvr>
-                                        <p:cTn id="15" dur="1" fill="hold">
+                                        <p:cTn id="16" dur="1" fill="hold">
                                           <p:stCondLst>
                                             <p:cond delay="0"/>
                                           </p:stCondLst>
@@ -10305,7 +10516,7 @@
                                     </p:set>
                                     <p:animEffect transition="in" filter="dissolve">
                                       <p:cBhvr>
-                                        <p:cTn id="16" dur="500"/>
+                                        <p:cTn id="17" dur="500"/>
                                         <p:tgtEl>
                                           <p:spTgt spid="9376">
                                             <p:txEl>
@@ -10907,8 +11118,8 @@
   <p:clrMapOvr>
     <a:masterClrMapping/>
   </p:clrMapOvr>
-  <p:transition xmlns:p14="http://schemas.microsoft.com/office/powerpoint/2010/main" spd="slow">
-    <p:fade/>
+  <p:transition xmlns:p14="http://schemas.microsoft.com/office/powerpoint/2010/main" spd="slow" advClick="0">
+    <p:fade thruBlk="1"/>
   </p:transition>
   <p:timing>
     <p:tnLst>
@@ -11369,7 +11580,7 @@
           <a:graphicData uri="http://schemas.openxmlformats.org/presentationml/2006/ole">
             <mc:AlternateContent xmlns:mc="http://schemas.openxmlformats.org/markup-compatibility/2006">
               <mc:Choice xmlns:v="urn:schemas-microsoft-com:vml" Requires="v">
-                <p:oleObj spid="_x0000_s7255" name="Equation" r:id="rId4" imgW="304560" imgH="139680" progId="Equation.DSMT4">
+                <p:oleObj spid="_x0000_s7269" name="Equation" r:id="rId4" imgW="304560" imgH="139680" progId="Equation.DSMT4">
                   <p:embed/>
                 </p:oleObj>
               </mc:Choice>
@@ -11439,7 +11650,7 @@
           <a:graphicData uri="http://schemas.openxmlformats.org/presentationml/2006/ole">
             <mc:AlternateContent xmlns:mc="http://schemas.openxmlformats.org/markup-compatibility/2006">
               <mc:Choice xmlns:v="urn:schemas-microsoft-com:vml" Requires="v">
-                <p:oleObj spid="_x0000_s7256" name="Equation" r:id="rId6" imgW="304560" imgH="139680" progId="Equation.DSMT4">
+                <p:oleObj spid="_x0000_s7270" name="Equation" r:id="rId6" imgW="304560" imgH="139680" progId="Equation.DSMT4">
                   <p:embed/>
                 </p:oleObj>
               </mc:Choice>
@@ -11733,7 +11944,7 @@
   <p:clrMapOvr>
     <a:masterClrMapping/>
   </p:clrMapOvr>
-  <p:transition xmlns:p14="http://schemas.microsoft.com/office/powerpoint/2010/main" spd="slow">
+  <p:transition xmlns:p14="http://schemas.microsoft.com/office/powerpoint/2010/main" spd="slow" advClick="0">
     <p:fade/>
   </p:transition>
   <p:timing>
@@ -11967,7 +12178,7 @@
           <a:graphicData uri="http://schemas.openxmlformats.org/presentationml/2006/ole">
             <mc:AlternateContent xmlns:mc="http://schemas.openxmlformats.org/markup-compatibility/2006">
               <mc:Choice xmlns:v="urn:schemas-microsoft-com:vml" Requires="v">
-                <p:oleObj spid="_x0000_s194605" name="Equation" r:id="rId4" imgW="914400" imgH="215640" progId="Equation.3">
+                <p:oleObj spid="_x0000_s194619" name="Equation" r:id="rId4" imgW="914400" imgH="215640" progId="Equation.3">
                   <p:embed/>
                 </p:oleObj>
               </mc:Choice>
@@ -12037,7 +12248,7 @@
           <a:graphicData uri="http://schemas.openxmlformats.org/presentationml/2006/ole">
             <mc:AlternateContent xmlns:mc="http://schemas.openxmlformats.org/markup-compatibility/2006">
               <mc:Choice xmlns:v="urn:schemas-microsoft-com:vml" Requires="v">
-                <p:oleObj spid="_x0000_s194606" name="Equation" r:id="rId6" imgW="914400" imgH="215640" progId="Equation.3">
+                <p:oleObj spid="_x0000_s194620" name="Equation" r:id="rId6" imgW="914400" imgH="215640" progId="Equation.3">
                   <p:embed/>
                 </p:oleObj>
               </mc:Choice>
@@ -12101,7 +12312,7 @@
   <p:clrMapOvr>
     <a:masterClrMapping/>
   </p:clrMapOvr>
-  <p:transition xmlns:p14="http://schemas.microsoft.com/office/powerpoint/2010/main" spd="slow">
+  <p:transition xmlns:p14="http://schemas.microsoft.com/office/powerpoint/2010/main" spd="slow" advClick="0">
     <p:fade/>
   </p:transition>
   <p:timing>
@@ -12208,7 +12419,7 @@
           <a:graphicData uri="http://schemas.openxmlformats.org/presentationml/2006/ole">
             <mc:AlternateContent xmlns:mc="http://schemas.openxmlformats.org/markup-compatibility/2006">
               <mc:Choice xmlns:v="urn:schemas-microsoft-com:vml" Requires="v">
-                <p:oleObj spid="_x0000_s209950" name="Equation" r:id="rId4" imgW="114120" imgH="177480" progId="Equation.DSMT4">
+                <p:oleObj spid="_x0000_s209966" name="Equation" r:id="rId4" imgW="114120" imgH="177480" progId="Equation.DSMT4">
                   <p:embed/>
                 </p:oleObj>
               </mc:Choice>
@@ -12813,7 +13024,7 @@
           <a:graphicData uri="http://schemas.openxmlformats.org/presentationml/2006/ole">
             <mc:AlternateContent xmlns:mc="http://schemas.openxmlformats.org/markup-compatibility/2006">
               <mc:Choice xmlns:v="urn:schemas-microsoft-com:vml" Requires="v">
-                <p:oleObj spid="_x0000_s209951" name="Equation" r:id="rId6" imgW="635000" imgH="469900" progId="Equation.DSMT4">
+                <p:oleObj spid="_x0000_s209967" name="Equation" r:id="rId6" imgW="635000" imgH="469900" progId="Equation.DSMT4">
                   <p:embed/>
                 </p:oleObj>
               </mc:Choice>
@@ -12858,7 +13069,7 @@
   <p:clrMapOvr>
     <a:masterClrMapping/>
   </p:clrMapOvr>
-  <p:transition xmlns:p14="http://schemas.microsoft.com/office/powerpoint/2010/main" spd="slow">
+  <p:transition xmlns:p14="http://schemas.microsoft.com/office/powerpoint/2010/main" spd="slow" advClick="0">
     <p:fade/>
   </p:transition>
   <p:timing>
@@ -13041,7 +13252,7 @@
           <a:graphicData uri="http://schemas.openxmlformats.org/presentationml/2006/ole">
             <mc:AlternateContent xmlns:mc="http://schemas.openxmlformats.org/markup-compatibility/2006">
               <mc:Choice xmlns:v="urn:schemas-microsoft-com:vml" Requires="v">
-                <p:oleObj spid="_x0000_s187453" name="Equation" r:id="rId4" imgW="114120" imgH="177480" progId="Equation.DSMT4">
+                <p:oleObj spid="_x0000_s187467" name="Equation" r:id="rId4" imgW="114120" imgH="177480" progId="Equation.DSMT4">
                   <p:embed/>
                 </p:oleObj>
               </mc:Choice>
@@ -13720,7 +13931,7 @@
           <a:graphicData uri="http://schemas.openxmlformats.org/presentationml/2006/ole">
             <mc:AlternateContent xmlns:mc="http://schemas.openxmlformats.org/markup-compatibility/2006">
               <mc:Choice xmlns:v="urn:schemas-microsoft-com:vml" Requires="v">
-                <p:oleObj spid="_x0000_s187454" name="Equation" r:id="rId6" imgW="635000" imgH="444500" progId="Equation.DSMT4">
+                <p:oleObj spid="_x0000_s187468" name="Equation" r:id="rId6" imgW="635000" imgH="444500" progId="Equation.DSMT4">
                   <p:embed/>
                 </p:oleObj>
               </mc:Choice>
@@ -13765,7 +13976,7 @@
   <p:clrMapOvr>
     <a:masterClrMapping/>
   </p:clrMapOvr>
-  <p:transition xmlns:p14="http://schemas.microsoft.com/office/powerpoint/2010/main" spd="slow">
+  <p:transition xmlns:p14="http://schemas.microsoft.com/office/powerpoint/2010/main" spd="slow" advClick="0">
     <p:fade/>
   </p:transition>
   <p:timing>
@@ -15482,7 +15693,7 @@
   <p:clrMapOvr>
     <a:masterClrMapping/>
   </p:clrMapOvr>
-  <p:transition xmlns:p14="http://schemas.microsoft.com/office/powerpoint/2010/main" spd="slow">
+  <p:transition xmlns:p14="http://schemas.microsoft.com/office/powerpoint/2010/main" spd="slow" advClick="0">
     <p:fade thruBlk="1"/>
   </p:transition>
   <p:timing>
@@ -17705,7 +17916,7 @@
   <p:clrMapOvr>
     <a:masterClrMapping/>
   </p:clrMapOvr>
-  <p:transition xmlns:p14="http://schemas.microsoft.com/office/powerpoint/2010/main" spd="slow">
+  <p:transition xmlns:p14="http://schemas.microsoft.com/office/powerpoint/2010/main" spd="slow" advClick="0">
     <p:fade/>
   </p:transition>
   <p:timing>
@@ -18573,7 +18784,7 @@
   <p:clrMapOvr>
     <a:masterClrMapping/>
   </p:clrMapOvr>
-  <p:transition xmlns:p14="http://schemas.microsoft.com/office/powerpoint/2010/main" spd="slow">
+  <p:transition xmlns:p14="http://schemas.microsoft.com/office/powerpoint/2010/main" spd="slow" advClick="0">
     <p:fade/>
   </p:transition>
   <p:timing>
@@ -18894,22 +19105,28 @@
           <p:cNvGraphicFramePr>
             <a:graphicFrameLocks noChangeAspect="1"/>
           </p:cNvGraphicFramePr>
-          <p:nvPr/>
+          <p:nvPr>
+            <p:extLst>
+              <p:ext uri="{D42A27DB-BD31-4B8C-83A1-F6EECF244321}">
+                <p14:modId xmlns:p14="http://schemas.microsoft.com/office/powerpoint/2010/main" val="1062783483"/>
+              </p:ext>
+            </p:extLst>
+          </p:nvPr>
         </p:nvGraphicFramePr>
         <p:xfrm>
-          <a:off x="468313" y="4532313"/>
-          <a:ext cx="3549650" cy="1255712"/>
+          <a:off x="450850" y="4514850"/>
+          <a:ext cx="3586163" cy="1290638"/>
         </p:xfrm>
         <a:graphic>
           <a:graphicData uri="http://schemas.openxmlformats.org/presentationml/2006/ole">
             <mc:AlternateContent xmlns:mc="http://schemas.openxmlformats.org/markup-compatibility/2006">
               <mc:Choice xmlns:v="urn:schemas-microsoft-com:vml" Requires="v">
-                <p:oleObj spid="_x0000_s9344" name="Equation" r:id="rId4" imgW="1257120" imgH="444240" progId="Equation.DSMT4">
+                <p:oleObj spid="_x0000_s9365" name="Equation" r:id="rId4" imgW="1270000" imgH="457200" progId="Equation.DSMT4">
                   <p:embed/>
                 </p:oleObj>
               </mc:Choice>
               <mc:Fallback>
-                <p:oleObj name="Equation" r:id="rId4" imgW="1257120" imgH="444240" progId="Equation.DSMT4">
+                <p:oleObj name="Equation" r:id="rId4" imgW="1270000" imgH="457200" progId="Equation.DSMT4">
                   <p:embed/>
                   <p:pic>
                     <p:nvPicPr>
@@ -18920,13 +19137,7 @@
                       <p:nvPr/>
                     </p:nvPicPr>
                     <p:blipFill>
-                      <a:blip r:embed="rId5">
-                        <a:extLst>
-                          <a:ext uri="{28A0092B-C50C-407E-A947-70E740481C1C}">
-                            <a14:useLocalDpi xmlns:a14="http://schemas.microsoft.com/office/drawing/2010/main" val="0"/>
-                          </a:ext>
-                        </a:extLst>
-                      </a:blip>
+                      <a:blip r:embed="rId5"/>
                       <a:srcRect/>
                       <a:stretch>
                         <a:fillRect/>
@@ -18934,8 +19145,8 @@
                     </p:blipFill>
                     <p:spPr bwMode="auto">
                       <a:xfrm>
-                        <a:off x="468313" y="4532313"/>
-                        <a:ext cx="3549650" cy="1255712"/>
+                        <a:off x="450850" y="4514850"/>
+                        <a:ext cx="3586163" cy="1290638"/>
                       </a:xfrm>
                       <a:prstGeom prst="rect">
                         <a:avLst/>
@@ -18989,22 +19200,28 @@
           <p:cNvGraphicFramePr>
             <a:graphicFrameLocks noChangeAspect="1"/>
           </p:cNvGraphicFramePr>
-          <p:nvPr/>
+          <p:nvPr>
+            <p:extLst>
+              <p:ext uri="{D42A27DB-BD31-4B8C-83A1-F6EECF244321}">
+                <p14:modId xmlns:p14="http://schemas.microsoft.com/office/powerpoint/2010/main" val="2170936243"/>
+              </p:ext>
+            </p:extLst>
+          </p:nvPr>
         </p:nvGraphicFramePr>
         <p:xfrm>
-          <a:off x="5168900" y="4600575"/>
-          <a:ext cx="3535363" cy="1235075"/>
+          <a:off x="5168900" y="4583113"/>
+          <a:ext cx="3535363" cy="1270000"/>
         </p:xfrm>
         <a:graphic>
           <a:graphicData uri="http://schemas.openxmlformats.org/presentationml/2006/ole">
             <mc:AlternateContent xmlns:mc="http://schemas.openxmlformats.org/markup-compatibility/2006">
               <mc:Choice xmlns:v="urn:schemas-microsoft-com:vml" Requires="v">
-                <p:oleObj spid="_x0000_s9345" name="Equation" r:id="rId6" imgW="1269720" imgH="444240" progId="Equation.DSMT4">
+                <p:oleObj spid="_x0000_s9366" name="Equation" r:id="rId6" imgW="1270000" imgH="457200" progId="Equation.DSMT4">
                   <p:embed/>
                 </p:oleObj>
               </mc:Choice>
               <mc:Fallback>
-                <p:oleObj name="Equation" r:id="rId6" imgW="1269720" imgH="444240" progId="Equation.DSMT4">
+                <p:oleObj name="Equation" r:id="rId6" imgW="1270000" imgH="457200" progId="Equation.DSMT4">
                   <p:embed/>
                   <p:pic>
                     <p:nvPicPr>
@@ -19015,13 +19232,7 @@
                       <p:nvPr/>
                     </p:nvPicPr>
                     <p:blipFill>
-                      <a:blip r:embed="rId7">
-                        <a:extLst>
-                          <a:ext uri="{28A0092B-C50C-407E-A947-70E740481C1C}">
-                            <a14:useLocalDpi xmlns:a14="http://schemas.microsoft.com/office/drawing/2010/main" val="0"/>
-                          </a:ext>
-                        </a:extLst>
-                      </a:blip>
+                      <a:blip r:embed="rId7"/>
                       <a:srcRect/>
                       <a:stretch>
                         <a:fillRect/>
@@ -19029,8 +19240,8 @@
                     </p:blipFill>
                     <p:spPr bwMode="auto">
                       <a:xfrm>
-                        <a:off x="5168900" y="4600575"/>
-                        <a:ext cx="3535363" cy="1235075"/>
+                        <a:off x="5168900" y="4583113"/>
+                        <a:ext cx="3535363" cy="1270000"/>
                       </a:xfrm>
                       <a:prstGeom prst="rect">
                         <a:avLst/>
@@ -19172,7 +19383,7 @@
           <a:graphicData uri="http://schemas.openxmlformats.org/presentationml/2006/ole">
             <mc:AlternateContent xmlns:mc="http://schemas.openxmlformats.org/markup-compatibility/2006">
               <mc:Choice xmlns:v="urn:schemas-microsoft-com:vml" Requires="v">
-                <p:oleObj spid="_x0000_s9346" name="Equation" r:id="rId8" imgW="774360" imgH="203040" progId="Equation.DSMT4">
+                <p:oleObj spid="_x0000_s9367" name="Equation" r:id="rId8" imgW="774360" imgH="203040" progId="Equation.DSMT4">
                   <p:embed/>
                 </p:oleObj>
               </mc:Choice>
@@ -19256,7 +19467,7 @@
   <p:clrMapOvr>
     <a:masterClrMapping/>
   </p:clrMapOvr>
-  <p:transition xmlns:p14="http://schemas.microsoft.com/office/powerpoint/2010/main" spd="slow">
+  <p:transition xmlns:p14="http://schemas.microsoft.com/office/powerpoint/2010/main" spd="slow" advClick="0">
     <p:fade thruBlk="1"/>
   </p:transition>
   <p:timing>
@@ -19764,7 +19975,7 @@
             <a:graphicData uri="http://schemas.openxmlformats.org/presentationml/2006/ole">
               <mc:AlternateContent xmlns:mc="http://schemas.openxmlformats.org/markup-compatibility/2006">
                 <mc:Choice xmlns:v="urn:schemas-microsoft-com:vml" Requires="v">
-                  <p:oleObj spid="_x0000_s10329" name="Equation" r:id="rId4" imgW="774360" imgH="203040" progId="Equation.DSMT4">
+                  <p:oleObj spid="_x0000_s10343" name="Equation" r:id="rId4" imgW="774360" imgH="203040" progId="Equation.DSMT4">
                     <p:embed/>
                   </p:oleObj>
                 </mc:Choice>
@@ -19929,7 +20140,7 @@
             <a:graphicData uri="http://schemas.openxmlformats.org/presentationml/2006/ole">
               <mc:AlternateContent xmlns:mc="http://schemas.openxmlformats.org/markup-compatibility/2006">
                 <mc:Choice xmlns:v="urn:schemas-microsoft-com:vml" Requires="v">
-                  <p:oleObj spid="_x0000_s10330" name="Equation" r:id="rId6" imgW="736560" imgH="203040" progId="Equation.DSMT4">
+                  <p:oleObj spid="_x0000_s10344" name="Equation" r:id="rId6" imgW="736560" imgH="203040" progId="Equation.DSMT4">
                     <p:embed/>
                   </p:oleObj>
                 </mc:Choice>
@@ -19989,7 +20200,7 @@
   <p:clrMapOvr>
     <a:masterClrMapping/>
   </p:clrMapOvr>
-  <p:transition xmlns:p14="http://schemas.microsoft.com/office/powerpoint/2010/main" spd="slow">
+  <p:transition xmlns:p14="http://schemas.microsoft.com/office/powerpoint/2010/main" spd="slow" advClick="0">
     <p:fade/>
   </p:transition>
   <p:timing>
@@ -20755,7 +20966,7 @@
           <a:graphicData uri="http://schemas.openxmlformats.org/presentationml/2006/ole">
             <mc:AlternateContent xmlns:mc="http://schemas.openxmlformats.org/markup-compatibility/2006">
               <mc:Choice xmlns:v="urn:schemas-microsoft-com:vml" Requires="v">
-                <p:oleObj spid="_x0000_s11355" name="Equation" r:id="rId4" imgW="114120" imgH="177480" progId="Equation.DSMT4">
+                <p:oleObj spid="_x0000_s11369" name="Equation" r:id="rId4" imgW="114120" imgH="177480" progId="Equation.DSMT4">
                   <p:embed/>
                 </p:oleObj>
               </mc:Choice>
@@ -20825,7 +21036,7 @@
           <a:graphicData uri="http://schemas.openxmlformats.org/presentationml/2006/ole">
             <mc:AlternateContent xmlns:mc="http://schemas.openxmlformats.org/markup-compatibility/2006">
               <mc:Choice xmlns:v="urn:schemas-microsoft-com:vml" Requires="v">
-                <p:oleObj spid="_x0000_s11356" name="Equation" r:id="rId6" imgW="114120" imgH="177480" progId="Equation.DSMT4">
+                <p:oleObj spid="_x0000_s11370" name="Equation" r:id="rId6" imgW="114120" imgH="177480" progId="Equation.DSMT4">
                   <p:embed/>
                 </p:oleObj>
               </mc:Choice>
@@ -20884,7 +21095,7 @@
   <p:clrMapOvr>
     <a:masterClrMapping/>
   </p:clrMapOvr>
-  <p:transition xmlns:p14="http://schemas.microsoft.com/office/powerpoint/2010/main" spd="slow">
+  <p:transition xmlns:p14="http://schemas.microsoft.com/office/powerpoint/2010/main" spd="slow" advClick="0">
     <p:fade/>
   </p:transition>
   <p:timing>
@@ -21432,7 +21643,7 @@
   <p:clrMapOvr>
     <a:masterClrMapping/>
   </p:clrMapOvr>
-  <p:transition xmlns:p14="http://schemas.microsoft.com/office/powerpoint/2010/main" spd="slow">
+  <p:transition xmlns:p14="http://schemas.microsoft.com/office/powerpoint/2010/main" spd="slow" advClick="0">
     <p:fade/>
   </p:transition>
   <p:timing>
@@ -21709,7 +21920,7 @@
           <a:graphicData uri="http://schemas.openxmlformats.org/presentationml/2006/ole">
             <mc:AlternateContent xmlns:mc="http://schemas.openxmlformats.org/markup-compatibility/2006">
               <mc:Choice xmlns:v="urn:schemas-microsoft-com:vml" Requires="v">
-                <p:oleObj spid="_x0000_s184373" name="Equation" r:id="rId4" imgW="2552700" imgH="419100" progId="Equation.DSMT4">
+                <p:oleObj spid="_x0000_s184380" name="Equation" r:id="rId4" imgW="2552700" imgH="419100" progId="Equation.DSMT4">
                   <p:embed/>
                 </p:oleObj>
               </mc:Choice>
@@ -21889,7 +22100,7 @@
   <p:clrMapOvr>
     <a:masterClrMapping/>
   </p:clrMapOvr>
-  <p:transition xmlns:p14="http://schemas.microsoft.com/office/powerpoint/2010/main" spd="slow">
+  <p:transition xmlns:p14="http://schemas.microsoft.com/office/powerpoint/2010/main" spd="slow" advClick="0">
     <p:fade thruBlk="1"/>
   </p:transition>
   <p:timing>
@@ -22269,7 +22480,7 @@
           <a:graphicData uri="http://schemas.openxmlformats.org/presentationml/2006/ole">
             <mc:AlternateContent xmlns:mc="http://schemas.openxmlformats.org/markup-compatibility/2006">
               <mc:Choice xmlns:v="urn:schemas-microsoft-com:vml" Requires="v">
-                <p:oleObj spid="_x0000_s140379" name="Equation" r:id="rId4" imgW="914400" imgH="215640" progId="Equation.3">
+                <p:oleObj spid="_x0000_s140397" name="Equation" r:id="rId4" imgW="914400" imgH="215640" progId="Equation.3">
                   <p:embed/>
                 </p:oleObj>
               </mc:Choice>
@@ -22339,7 +22550,7 @@
           <a:graphicData uri="http://schemas.openxmlformats.org/presentationml/2006/ole">
             <mc:AlternateContent xmlns:mc="http://schemas.openxmlformats.org/markup-compatibility/2006">
               <mc:Choice xmlns:v="urn:schemas-microsoft-com:vml" Requires="v">
-                <p:oleObj spid="_x0000_s140380" name="Equation" r:id="rId6" imgW="914400" imgH="215640" progId="Equation.3">
+                <p:oleObj spid="_x0000_s140398" name="Equation" r:id="rId6" imgW="914400" imgH="215640" progId="Equation.3">
                   <p:embed/>
                 </p:oleObj>
               </mc:Choice>
@@ -22450,8 +22661,12 @@
           <a:p>
             <a:pPr eaLnBrk="1" hangingPunct="1"/>
             <a:r>
-              <a:rPr lang="en-US" smtClean="0"/>
-              <a:t>Course Web site</a:t>
+              <a:rPr lang="en-US" dirty="0" smtClean="0"/>
+              <a:t>Stellar </a:t>
+            </a:r>
+            <a:r>
+              <a:rPr lang="en-US" dirty="0" smtClean="0"/>
+              <a:t>Web site</a:t>
             </a:r>
           </a:p>
         </p:txBody>
@@ -22467,7 +22682,7 @@
         <p:spPr bwMode="auto">
           <a:xfrm>
             <a:off x="203200" y="1168400"/>
-            <a:ext cx="8826500" cy="4154983"/>
+            <a:ext cx="8826500" cy="4462760"/>
           </a:xfrm>
           <a:prstGeom prst="rect">
             <a:avLst/>
@@ -22496,40 +22711,15 @@
                 </a:solidFill>
                 <a:latin typeface="Courier New" pitchFamily="49" charset="0"/>
                 <a:cs typeface="Courier New" pitchFamily="49" charset="0"/>
-              </a:rPr>
-              <a:t>https://</a:t>
-            </a:r>
-            <a:r>
-              <a:rPr lang="en-US" sz="2400" b="1" u="sng" kern="0" dirty="0" err="1">
-                <a:solidFill>
-                  <a:srgbClr val="A0106D"/>
-                </a:solidFill>
-                <a:latin typeface="Courier New" pitchFamily="49" charset="0"/>
-                <a:cs typeface="Courier New" pitchFamily="49" charset="0"/>
-              </a:rPr>
-              <a:t>stellar.mit.edu</a:t>
-            </a:r>
-            <a:r>
-              <a:rPr lang="en-US" sz="2400" b="1" u="sng" kern="0" dirty="0">
-                <a:solidFill>
-                  <a:srgbClr val="A0106D"/>
-                </a:solidFill>
-                <a:latin typeface="Courier New" pitchFamily="49" charset="0"/>
-                <a:cs typeface="Courier New" pitchFamily="49" charset="0"/>
-              </a:rPr>
-              <a:t>/S/course/6/sp14/6.042/</a:t>
+                <a:hlinkClick r:id="rId7"/>
+              </a:rPr>
+              <a:t>https://stellar.mit.edu/S/course/6/sp14/6.042/</a:t>
             </a:r>
             <a:r>
               <a:rPr lang="en-US" sz="4400" dirty="0" smtClean="0">
                 <a:latin typeface="Comic Sans MS" pitchFamily="66" charset="0"/>
               </a:rPr>
               <a:t> </a:t>
-            </a:r>
-            <a:r>
-              <a:rPr lang="en-US" sz="4400" dirty="0" smtClean="0">
-                <a:latin typeface="Comic Sans MS" pitchFamily="66" charset="0"/>
-              </a:rPr>
-              <a:t>announcements</a:t>
             </a:r>
             <a:endParaRPr lang="en-US" sz="4400" dirty="0">
               <a:latin typeface="Comic Sans MS" pitchFamily="66" charset="0"/>
@@ -22548,9 +22738,17 @@
                 </a:solidFill>
                 <a:latin typeface="Comic Sans MS" pitchFamily="66" charset="0"/>
               </a:rPr>
-              <a:t> class schedule</a:t>
-            </a:r>
-            <a:endParaRPr lang="en-US" dirty="0"/>
+              <a:t> </a:t>
+            </a:r>
+            <a:r>
+              <a:rPr lang="en-US" sz="6000" dirty="0">
+                <a:solidFill>
+                  <a:srgbClr val="000000"/>
+                </a:solidFill>
+                <a:latin typeface="Comic Sans MS" pitchFamily="66" charset="0"/>
+              </a:rPr>
+              <a:t> notes, handouts</a:t>
+            </a:r>
           </a:p>
           <a:p>
             <a:pPr algn="l">
@@ -22559,23 +22757,15 @@
               <a:defRPr/>
             </a:pPr>
             <a:r>
-              <a:rPr lang="en-US" sz="4400" dirty="0" smtClean="0">
+              <a:rPr lang="en-US" sz="6000" dirty="0" smtClean="0">
                 <a:solidFill>
                   <a:srgbClr val="000000"/>
                 </a:solidFill>
                 <a:latin typeface="Comic Sans MS" pitchFamily="66" charset="0"/>
               </a:rPr>
-              <a:t> notes</a:t>
-            </a:r>
-            <a:r>
-              <a:rPr lang="en-US" sz="4400" dirty="0">
-                <a:solidFill>
-                  <a:srgbClr val="000000"/>
-                </a:solidFill>
-                <a:latin typeface="Comic Sans MS" pitchFamily="66" charset="0"/>
-              </a:rPr>
-              <a:t>, slides,…</a:t>
-            </a:r>
+              <a:t>  class calendar</a:t>
+            </a:r>
+            <a:endParaRPr lang="en-US" sz="4400" dirty="0"/>
           </a:p>
           <a:p>
             <a:pPr algn="l">
@@ -22584,7 +22774,7 @@
               <a:defRPr/>
             </a:pPr>
             <a:r>
-              <a:rPr lang="en-US" sz="4400" dirty="0">
+              <a:rPr lang="en-US" sz="6000" dirty="0" smtClean="0">
                 <a:solidFill>
                   <a:srgbClr val="000000"/>
                 </a:solidFill>
@@ -22593,7 +22783,7 @@
               <a:t> </a:t>
             </a:r>
             <a:r>
-              <a:rPr lang="en-US" sz="4400" dirty="0" smtClean="0">
+              <a:rPr lang="en-US" sz="6000" dirty="0" smtClean="0">
                 <a:solidFill>
                   <a:srgbClr val="000000"/>
                 </a:solidFill>
@@ -22609,14 +22799,29 @@
               <a:defRPr/>
             </a:pPr>
             <a:r>
-              <a:rPr lang="en-US" sz="4400" dirty="0" smtClean="0">
+              <a:rPr lang="en-US" sz="6000" dirty="0" smtClean="0">
                 <a:solidFill>
                   <a:srgbClr val="000000"/>
                 </a:solidFill>
                 <a:latin typeface="Comic Sans MS" pitchFamily="66" charset="0"/>
               </a:rPr>
-              <a:t> grading info</a:t>
-            </a:r>
+              <a:t> </a:t>
+            </a:r>
+            <a:r>
+              <a:rPr lang="en-US" sz="6000" dirty="0" smtClean="0">
+                <a:solidFill>
+                  <a:srgbClr val="000000"/>
+                </a:solidFill>
+                <a:latin typeface="Comic Sans MS" pitchFamily="66" charset="0"/>
+              </a:rPr>
+              <a:t> problem submission</a:t>
+            </a:r>
+            <a:endParaRPr lang="en-US" sz="6000" dirty="0" smtClean="0">
+              <a:solidFill>
+                <a:srgbClr val="000000"/>
+              </a:solidFill>
+              <a:latin typeface="Comic Sans MS" pitchFamily="66" charset="0"/>
+            </a:endParaRPr>
           </a:p>
         </p:txBody>
       </p:sp>
@@ -22649,7 +22854,7 @@
                             </p:stCondLst>
                             <p:childTnLst>
                               <p:par>
-                                <p:cTn id="5" presetID="1" presetClass="entr" presetSubtype="0" fill="hold" grpId="0" nodeType="clickEffect">
+                                <p:cTn id="5" presetID="9" presetClass="entr" presetSubtype="0" fill="hold" grpId="0" nodeType="clickEffect">
                                   <p:stCondLst>
                                     <p:cond delay="0"/>
                                   </p:stCondLst>
@@ -22676,6 +22881,18 @@
                                         <p:strVal val="visible"/>
                                       </p:to>
                                     </p:set>
+                                    <p:animEffect transition="in" filter="dissolve">
+                                      <p:cBhvr>
+                                        <p:cTn id="7" dur="500"/>
+                                        <p:tgtEl>
+                                          <p:spTgt spid="5128">
+                                            <p:txEl>
+                                              <p:pRg st="1" end="1"/>
+                                            </p:txEl>
+                                          </p:spTgt>
+                                        </p:tgtEl>
+                                      </p:cBhvr>
+                                    </p:animEffect>
                                   </p:childTnLst>
                                 </p:cTn>
                               </p:par>
@@ -22686,26 +22903,26 @@
                     </p:cTn>
                   </p:par>
                   <p:par>
-                    <p:cTn id="7" fill="hold">
+                    <p:cTn id="8" fill="hold">
                       <p:stCondLst>
                         <p:cond delay="indefinite"/>
                       </p:stCondLst>
                       <p:childTnLst>
                         <p:par>
-                          <p:cTn id="8" fill="hold">
+                          <p:cTn id="9" fill="hold">
                             <p:stCondLst>
                               <p:cond delay="0"/>
                             </p:stCondLst>
                             <p:childTnLst>
                               <p:par>
-                                <p:cTn id="9" presetID="1" presetClass="entr" presetSubtype="0" fill="hold" grpId="0" nodeType="clickEffect">
+                                <p:cTn id="10" presetID="9" presetClass="entr" presetSubtype="0" fill="hold" grpId="0" nodeType="clickEffect">
                                   <p:stCondLst>
                                     <p:cond delay="0"/>
                                   </p:stCondLst>
                                   <p:childTnLst>
                                     <p:set>
                                       <p:cBhvr>
-                                        <p:cTn id="10" dur="1" fill="hold">
+                                        <p:cTn id="11" dur="1" fill="hold">
                                           <p:stCondLst>
                                             <p:cond delay="0"/>
                                           </p:stCondLst>
@@ -22725,6 +22942,18 @@
                                         <p:strVal val="visible"/>
                                       </p:to>
                                     </p:set>
+                                    <p:animEffect transition="in" filter="dissolve">
+                                      <p:cBhvr>
+                                        <p:cTn id="12" dur="500"/>
+                                        <p:tgtEl>
+                                          <p:spTgt spid="5128">
+                                            <p:txEl>
+                                              <p:pRg st="2" end="2"/>
+                                            </p:txEl>
+                                          </p:spTgt>
+                                        </p:tgtEl>
+                                      </p:cBhvr>
+                                    </p:animEffect>
                                   </p:childTnLst>
                                 </p:cTn>
                               </p:par>
@@ -22735,26 +22964,26 @@
                     </p:cTn>
                   </p:par>
                   <p:par>
-                    <p:cTn id="11" fill="hold">
+                    <p:cTn id="13" fill="hold">
                       <p:stCondLst>
                         <p:cond delay="indefinite"/>
                       </p:stCondLst>
                       <p:childTnLst>
                         <p:par>
-                          <p:cTn id="12" fill="hold">
+                          <p:cTn id="14" fill="hold">
                             <p:stCondLst>
                               <p:cond delay="0"/>
                             </p:stCondLst>
                             <p:childTnLst>
                               <p:par>
-                                <p:cTn id="13" presetID="1" presetClass="entr" presetSubtype="0" fill="hold" grpId="0" nodeType="clickEffect">
+                                <p:cTn id="15" presetID="9" presetClass="entr" presetSubtype="0" fill="hold" grpId="0" nodeType="clickEffect">
                                   <p:stCondLst>
                                     <p:cond delay="0"/>
                                   </p:stCondLst>
                                   <p:childTnLst>
                                     <p:set>
                                       <p:cBhvr>
-                                        <p:cTn id="14" dur="1" fill="hold">
+                                        <p:cTn id="16" dur="1" fill="hold">
                                           <p:stCondLst>
                                             <p:cond delay="0"/>
                                           </p:stCondLst>
@@ -22774,6 +23003,18 @@
                                         <p:strVal val="visible"/>
                                       </p:to>
                                     </p:set>
+                                    <p:animEffect transition="in" filter="dissolve">
+                                      <p:cBhvr>
+                                        <p:cTn id="17" dur="500"/>
+                                        <p:tgtEl>
+                                          <p:spTgt spid="5128">
+                                            <p:txEl>
+                                              <p:pRg st="3" end="3"/>
+                                            </p:txEl>
+                                          </p:spTgt>
+                                        </p:tgtEl>
+                                      </p:cBhvr>
+                                    </p:animEffect>
                                   </p:childTnLst>
                                 </p:cTn>
                               </p:par>
@@ -22784,26 +23025,26 @@
                     </p:cTn>
                   </p:par>
                   <p:par>
-                    <p:cTn id="15" fill="hold">
+                    <p:cTn id="18" fill="hold">
                       <p:stCondLst>
                         <p:cond delay="indefinite"/>
                       </p:stCondLst>
                       <p:childTnLst>
                         <p:par>
-                          <p:cTn id="16" fill="hold">
+                          <p:cTn id="19" fill="hold">
                             <p:stCondLst>
                               <p:cond delay="0"/>
                             </p:stCondLst>
                             <p:childTnLst>
                               <p:par>
-                                <p:cTn id="17" presetID="1" presetClass="entr" presetSubtype="0" fill="hold" grpId="0" nodeType="clickEffect">
+                                <p:cTn id="20" presetID="9" presetClass="entr" presetSubtype="0" fill="hold" grpId="0" nodeType="clickEffect">
                                   <p:stCondLst>
                                     <p:cond delay="0"/>
                                   </p:stCondLst>
                                   <p:childTnLst>
                                     <p:set>
                                       <p:cBhvr>
-                                        <p:cTn id="18" dur="1" fill="hold">
+                                        <p:cTn id="21" dur="1" fill="hold">
                                           <p:stCondLst>
                                             <p:cond delay="0"/>
                                           </p:stCondLst>
@@ -22823,6 +23064,18 @@
                                         <p:strVal val="visible"/>
                                       </p:to>
                                     </p:set>
+                                    <p:animEffect transition="in" filter="dissolve">
+                                      <p:cBhvr>
+                                        <p:cTn id="22" dur="500"/>
+                                        <p:tgtEl>
+                                          <p:spTgt spid="5128">
+                                            <p:txEl>
+                                              <p:pRg st="4" end="4"/>
+                                            </p:txEl>
+                                          </p:spTgt>
+                                        </p:tgtEl>
+                                      </p:cBhvr>
+                                    </p:animEffect>
                                   </p:childTnLst>
                                 </p:cTn>
                               </p:par>
@@ -22998,7 +23251,7 @@
           <a:graphicData uri="http://schemas.openxmlformats.org/presentationml/2006/ole">
             <mc:AlternateContent xmlns:mc="http://schemas.openxmlformats.org/markup-compatibility/2006">
               <mc:Choice xmlns:v="urn:schemas-microsoft-com:vml" Requires="v">
-                <p:oleObj spid="_x0000_s12342" name="Equation" r:id="rId4" imgW="2590560" imgH="368280" progId="Equation.DSMT4">
+                <p:oleObj spid="_x0000_s12349" name="Equation" r:id="rId4" imgW="2590560" imgH="368280" progId="Equation.DSMT4">
                   <p:embed/>
                 </p:oleObj>
               </mc:Choice>
@@ -23202,7 +23455,7 @@
   <p:clrMapOvr>
     <a:masterClrMapping/>
   </p:clrMapOvr>
-  <p:transition xmlns:p14="http://schemas.microsoft.com/office/powerpoint/2010/main" spd="slow">
+  <p:transition xmlns:p14="http://schemas.microsoft.com/office/powerpoint/2010/main" spd="slow" advClick="0">
     <p:fade/>
   </p:transition>
   <p:timing>
@@ -23889,7 +24142,7 @@
           <a:graphicData uri="http://schemas.openxmlformats.org/presentationml/2006/ole">
             <mc:AlternateContent xmlns:mc="http://schemas.openxmlformats.org/markup-compatibility/2006">
               <mc:Choice xmlns:v="urn:schemas-microsoft-com:vml" Requires="v">
-                <p:oleObj spid="_x0000_s13366" name="Equation" r:id="rId4" imgW="152280" imgH="393480" progId="Equation.DSMT4">
+                <p:oleObj spid="_x0000_s13373" name="Equation" r:id="rId4" imgW="152280" imgH="393480" progId="Equation.DSMT4">
                   <p:embed/>
                 </p:oleObj>
               </mc:Choice>
@@ -23948,14 +24201,14 @@
   <p:clrMapOvr>
     <a:masterClrMapping/>
   </p:clrMapOvr>
-  <mc:AlternateContent xmlns:mc="http://schemas.openxmlformats.org/markup-compatibility/2006" xmlns:p14="http://schemas.microsoft.com/office/powerpoint/2010/main">
-    <mc:Choice Requires="p14">
-      <p:transition spd="med" p14:dur="600">
+  <mc:AlternateContent xmlns:mc="http://schemas.openxmlformats.org/markup-compatibility/2006">
+    <mc:Choice xmlns:p14="http://schemas.microsoft.com/office/powerpoint/2010/main" Requires="p14">
+      <p:transition spd="med" p14:dur="600" advClick="0">
         <p:fade thruBlk="1"/>
       </p:transition>
     </mc:Choice>
-    <mc:Fallback xmlns="">
-      <p:transition xmlns:p14="http://schemas.microsoft.com/office/powerpoint/2010/main" spd="med">
+    <mc:Fallback>
+      <p:transition xmlns:p14="http://schemas.microsoft.com/office/powerpoint/2010/main" spd="med" advClick="0">
         <p:fade thruBlk="1"/>
       </p:transition>
     </mc:Fallback>
@@ -24446,7 +24699,7 @@
   <p:clrMapOvr>
     <a:masterClrMapping/>
   </p:clrMapOvr>
-  <p:transition xmlns:p14="http://schemas.microsoft.com/office/powerpoint/2010/main" spd="slow">
+  <p:transition xmlns:p14="http://schemas.microsoft.com/office/powerpoint/2010/main" spd="slow" advClick="0">
     <p:fade/>
   </p:transition>
   <p:timing>
@@ -24589,7 +24842,7 @@
   <p:clrMapOvr>
     <a:masterClrMapping/>
   </p:clrMapOvr>
-  <p:transition xmlns:p14="http://schemas.microsoft.com/office/powerpoint/2010/main" spd="slow">
+  <p:transition xmlns:p14="http://schemas.microsoft.com/office/powerpoint/2010/main" spd="slow" advClick="0">
     <p:fade/>
   </p:transition>
   <p:timing>
@@ -24603,7 +24856,7 @@
 </file>
 
 <file path=ppt/slides/slide4.xml><?xml version="1.0" encoding="utf-8"?>
-<p:sld xmlns:a="http://schemas.openxmlformats.org/drawingml/2006/main" xmlns:r="http://schemas.openxmlformats.org/officeDocument/2006/relationships" xmlns:p="http://schemas.openxmlformats.org/presentationml/2006/main" show="0">
+<p:sld xmlns:a="http://schemas.openxmlformats.org/drawingml/2006/main" xmlns:r="http://schemas.openxmlformats.org/officeDocument/2006/relationships" xmlns:p="http://schemas.openxmlformats.org/presentationml/2006/main">
   <p:cSld>
     <p:spTree>
       <p:nvGrpSpPr>
@@ -24681,7 +24934,7 @@
             <a:r>
               <a:rPr lang="en-US" dirty="0" smtClean="0">
                 <a:solidFill>
-                  <a:schemeClr val="tx1"/>
+                  <a:srgbClr val="CB21DD"/>
                 </a:solidFill>
               </a:rPr>
               <a:t>6.042r</a:t>
@@ -24700,7 +24953,7 @@
                   <a:schemeClr val="tx1"/>
                 </a:solidFill>
               </a:rPr>
-              <a:t>Registration</a:t>
+              <a:t>Website</a:t>
             </a:r>
             <a:endParaRPr lang="en-US" dirty="0" smtClean="0">
               <a:solidFill>
@@ -24726,7 +24979,7 @@
           <a:graphicData uri="http://schemas.openxmlformats.org/presentationml/2006/ole">
             <mc:AlternateContent xmlns:mc="http://schemas.openxmlformats.org/markup-compatibility/2006">
               <mc:Choice xmlns:v="urn:schemas-microsoft-com:vml" Requires="v">
-                <p:oleObj spid="_x0000_s2144" name="Equation" r:id="rId4" imgW="914400" imgH="215640" progId="Equation.3">
+                <p:oleObj spid="_x0000_s2162" name="Equation" r:id="rId4" imgW="914400" imgH="215640" progId="Equation.3">
                   <p:embed/>
                 </p:oleObj>
               </mc:Choice>
@@ -24796,7 +25049,7 @@
           <a:graphicData uri="http://schemas.openxmlformats.org/presentationml/2006/ole">
             <mc:AlternateContent xmlns:mc="http://schemas.openxmlformats.org/markup-compatibility/2006">
               <mc:Choice xmlns:v="urn:schemas-microsoft-com:vml" Requires="v">
-                <p:oleObj spid="_x0000_s2145" name="Equation" r:id="rId6" imgW="914400" imgH="215640" progId="Equation.3">
+                <p:oleObj spid="_x0000_s2163" name="Equation" r:id="rId6" imgW="914400" imgH="215640" progId="Equation.3">
                   <p:embed/>
                 </p:oleObj>
               </mc:Choice>
@@ -24894,8 +25147,8 @@
         </p:nvSpPr>
         <p:spPr bwMode="auto">
           <a:xfrm>
-            <a:off x="620696" y="2142677"/>
-            <a:ext cx="7922170" cy="2585323"/>
+            <a:off x="368301" y="1380677"/>
+            <a:ext cx="8369300" cy="4321623"/>
           </a:xfrm>
           <a:prstGeom prst="rect">
             <a:avLst/>
@@ -24919,28 +25172,95 @@
               <a:rPr lang="en-US" sz="5400" dirty="0" smtClean="0">
                 <a:latin typeface="Comic Sans MS" pitchFamily="66" charset="0"/>
               </a:rPr>
-              <a:t>TP.1:</a:t>
-            </a:r>
-            <a:r>
-              <a:rPr lang="en-US" sz="5400" b="1" dirty="0" smtClean="0">
+              <a:t>has </a:t>
+            </a:r>
+            <a:r>
+              <a:rPr lang="en-US" sz="5400" dirty="0" smtClean="0">
+                <a:solidFill>
+                  <a:schemeClr val="accent1">
+                    <a:lumMod val="50000"/>
+                  </a:schemeClr>
+                </a:solidFill>
                 <a:latin typeface="Comic Sans MS" pitchFamily="66" charset="0"/>
               </a:rPr>
-              <a:t> </a:t>
+              <a:t>videos, slides, online questions</a:t>
             </a:r>
             <a:r>
               <a:rPr lang="en-US" sz="5400" dirty="0" smtClean="0">
                 <a:latin typeface="Comic Sans MS" pitchFamily="66" charset="0"/>
               </a:rPr>
-              <a:t>Registration </a:t>
-            </a:r>
-            <a:r>
-              <a:rPr lang="en-US" sz="5400" dirty="0" err="1" smtClean="0">
+              <a:t>.</a:t>
+            </a:r>
+            <a:endParaRPr lang="en-US" sz="5400" dirty="0">
+              <a:latin typeface="Comic Sans MS" pitchFamily="66" charset="0"/>
+            </a:endParaRPr>
+          </a:p>
+          <a:p>
+            <a:pPr algn="l"/>
+            <a:r>
+              <a:rPr lang="en-US" sz="5400" dirty="0" smtClean="0">
                 <a:solidFill>
                   <a:srgbClr val="FF0000"/>
                 </a:solidFill>
                 <a:latin typeface="Comic Sans MS" pitchFamily="66" charset="0"/>
               </a:rPr>
-              <a:t>asap</a:t>
+              <a:t>Register </a:t>
+            </a:r>
+            <a:r>
+              <a:rPr lang="en-US" sz="5400" dirty="0" smtClean="0">
+                <a:latin typeface="Comic Sans MS" pitchFamily="66" charset="0"/>
+              </a:rPr>
+              <a:t>on</a:t>
+            </a:r>
+            <a:r>
+              <a:rPr lang="en-US" sz="5400" dirty="0" smtClean="0">
+                <a:solidFill>
+                  <a:srgbClr val="000000"/>
+                </a:solidFill>
+                <a:latin typeface="Comic Sans MS" pitchFamily="66" charset="0"/>
+              </a:rPr>
+              <a:t>line</a:t>
+            </a:r>
+            <a:r>
+              <a:rPr lang="en-US" sz="5400" dirty="0" smtClean="0">
+                <a:solidFill>
+                  <a:srgbClr val="FF0000"/>
+                </a:solidFill>
+                <a:latin typeface="Comic Sans MS" pitchFamily="66" charset="0"/>
+              </a:rPr>
+              <a:t> </a:t>
+            </a:r>
+            <a:r>
+              <a:rPr lang="en-US" sz="5400" dirty="0" smtClean="0">
+                <a:latin typeface="Comic Sans MS" pitchFamily="66" charset="0"/>
+              </a:rPr>
+              <a:t>by</a:t>
+            </a:r>
+            <a:r>
+              <a:rPr lang="en-US" sz="5400" dirty="0" smtClean="0">
+                <a:solidFill>
+                  <a:srgbClr val="FF0000"/>
+                </a:solidFill>
+                <a:latin typeface="Comic Sans MS" pitchFamily="66" charset="0"/>
+              </a:rPr>
+              <a:t> </a:t>
+            </a:r>
+            <a:r>
+              <a:rPr lang="en-US" sz="5400" dirty="0" smtClean="0">
+                <a:solidFill>
+                  <a:schemeClr val="accent1">
+                    <a:lumMod val="50000"/>
+                  </a:schemeClr>
+                </a:solidFill>
+                <a:latin typeface="Comic Sans MS" pitchFamily="66" charset="0"/>
+              </a:rPr>
+              <a:t>Friday midnight</a:t>
+            </a:r>
+            <a:r>
+              <a:rPr lang="en-US" sz="5400" dirty="0" smtClean="0">
+                <a:latin typeface="Comic Sans MS" pitchFamily="66" charset="0"/>
+              </a:rPr>
+              <a:t> for team</a:t>
             </a:r>
             <a:endParaRPr lang="en-US" sz="5400" dirty="0" smtClean="0">
               <a:solidFill>
@@ -24952,16 +25272,10 @@
           <a:p>
             <a:pPr algn="l"/>
             <a:r>
-              <a:rPr lang="en-US" sz="4800" dirty="0" smtClean="0">
-                <a:latin typeface="Comic Sans MS" pitchFamily="66" charset="0"/>
-              </a:rPr>
-              <a:t>--necessary for </a:t>
-            </a:r>
-            <a:r>
               <a:rPr lang="en-US" sz="5400" dirty="0" smtClean="0">
                 <a:latin typeface="Comic Sans MS" pitchFamily="66" charset="0"/>
               </a:rPr>
-              <a:t>table assignment for Monday</a:t>
+              <a:t>assignment</a:t>
             </a:r>
             <a:endParaRPr lang="en-US" sz="5400" dirty="0">
               <a:latin typeface="Comic Sans MS" pitchFamily="66" charset="0"/>
@@ -24974,7 +25288,7 @@
   <p:clrMapOvr>
     <a:masterClrMapping/>
   </p:clrMapOvr>
-  <p:transition xmlns:p14="http://schemas.microsoft.com/office/powerpoint/2010/main" spd="slow">
+  <p:transition xmlns:p14="http://schemas.microsoft.com/office/powerpoint/2010/main" spd="slow" advClick="0">
     <p:fade/>
   </p:transition>
   <p:timing>
@@ -25013,7 +25327,7 @@
                                         <p:tgtEl>
                                           <p:spTgt spid="2056">
                                             <p:txEl>
-                                              <p:pRg st="1" end="1"/>
+                                              <p:pRg st="0" end="0"/>
                                             </p:txEl>
                                           </p:spTgt>
                                         </p:tgtEl>
@@ -25031,7 +25345,111 @@
                                         <p:tgtEl>
                                           <p:spTgt spid="2056">
                                             <p:txEl>
+                                              <p:pRg st="0" end="0"/>
+                                            </p:txEl>
+                                          </p:spTgt>
+                                        </p:tgtEl>
+                                      </p:cBhvr>
+                                    </p:animEffect>
+                                  </p:childTnLst>
+                                </p:cTn>
+                              </p:par>
+                            </p:childTnLst>
+                          </p:cTn>
+                        </p:par>
+                      </p:childTnLst>
+                    </p:cTn>
+                  </p:par>
+                  <p:par>
+                    <p:cTn id="8" fill="hold">
+                      <p:stCondLst>
+                        <p:cond delay="indefinite"/>
+                      </p:stCondLst>
+                      <p:childTnLst>
+                        <p:par>
+                          <p:cTn id="9" fill="hold">
+                            <p:stCondLst>
+                              <p:cond delay="0"/>
+                            </p:stCondLst>
+                            <p:childTnLst>
+                              <p:par>
+                                <p:cTn id="10" presetID="9" presetClass="entr" presetSubtype="0" fill="hold" nodeType="clickEffect">
+                                  <p:stCondLst>
+                                    <p:cond delay="0"/>
+                                  </p:stCondLst>
+                                  <p:childTnLst>
+                                    <p:set>
+                                      <p:cBhvr>
+                                        <p:cTn id="11" dur="1" fill="hold">
+                                          <p:stCondLst>
+                                            <p:cond delay="0"/>
+                                          </p:stCondLst>
+                                        </p:cTn>
+                                        <p:tgtEl>
+                                          <p:spTgt spid="2056">
+                                            <p:txEl>
                                               <p:pRg st="1" end="1"/>
+                                            </p:txEl>
+                                          </p:spTgt>
+                                        </p:tgtEl>
+                                        <p:attrNameLst>
+                                          <p:attrName>style.visibility</p:attrName>
+                                        </p:attrNameLst>
+                                      </p:cBhvr>
+                                      <p:to>
+                                        <p:strVal val="visible"/>
+                                      </p:to>
+                                    </p:set>
+                                    <p:animEffect transition="in" filter="dissolve">
+                                      <p:cBhvr>
+                                        <p:cTn id="12" dur="500"/>
+                                        <p:tgtEl>
+                                          <p:spTgt spid="2056">
+                                            <p:txEl>
+                                              <p:pRg st="1" end="1"/>
+                                            </p:txEl>
+                                          </p:spTgt>
+                                        </p:tgtEl>
+                                      </p:cBhvr>
+                                    </p:animEffect>
+                                  </p:childTnLst>
+                                </p:cTn>
+                              </p:par>
+                              <p:par>
+                                <p:cTn id="13" presetID="9" presetClass="entr" presetSubtype="0" fill="hold" nodeType="withEffect">
+                                  <p:stCondLst>
+                                    <p:cond delay="0"/>
+                                  </p:stCondLst>
+                                  <p:childTnLst>
+                                    <p:set>
+                                      <p:cBhvr>
+                                        <p:cTn id="14" dur="1" fill="hold">
+                                          <p:stCondLst>
+                                            <p:cond delay="0"/>
+                                          </p:stCondLst>
+                                        </p:cTn>
+                                        <p:tgtEl>
+                                          <p:spTgt spid="2056">
+                                            <p:txEl>
+                                              <p:pRg st="2" end="2"/>
+                                            </p:txEl>
+                                          </p:spTgt>
+                                        </p:tgtEl>
+                                        <p:attrNameLst>
+                                          <p:attrName>style.visibility</p:attrName>
+                                        </p:attrNameLst>
+                                      </p:cBhvr>
+                                      <p:to>
+                                        <p:strVal val="visible"/>
+                                      </p:to>
+                                    </p:set>
+                                    <p:animEffect transition="in" filter="dissolve">
+                                      <p:cBhvr>
+                                        <p:cTn id="15" dur="500"/>
+                                        <p:tgtEl>
+                                          <p:spTgt spid="2056">
+                                            <p:txEl>
+                                              <p:pRg st="2" end="2"/>
                                             </p:txEl>
                                           </p:spTgt>
                                         </p:tgtEl>
@@ -25123,8 +25541,8 @@
         </p:nvSpPr>
         <p:spPr>
           <a:xfrm>
-            <a:off x="126996" y="2008910"/>
-            <a:ext cx="8947726" cy="4110182"/>
+            <a:off x="63496" y="2910610"/>
+            <a:ext cx="9017004" cy="1026390"/>
           </a:xfrm>
         </p:spPr>
         <p:txBody>
@@ -25135,37 +25553,7 @@
               <a:buNone/>
             </a:pPr>
             <a:r>
-              <a:rPr lang="en-US" sz="4000" b="1" dirty="0" smtClean="0">
-                <a:latin typeface="Comic Sans MS"/>
-                <a:cs typeface="Comic Sans MS"/>
-              </a:rPr>
-              <a:t>To </a:t>
-            </a:r>
-            <a:r>
-              <a:rPr lang="en-US" sz="4000" b="1" dirty="0">
-                <a:latin typeface="Comic Sans MS"/>
-                <a:cs typeface="Comic Sans MS"/>
-              </a:rPr>
-              <a:t>request </a:t>
-            </a:r>
-            <a:r>
-              <a:rPr lang="en-US" sz="4000" b="1" dirty="0" smtClean="0">
-                <a:latin typeface="Comic Sans MS"/>
-                <a:cs typeface="Comic Sans MS"/>
-              </a:rPr>
-              <a:t>changes e</a:t>
-            </a:r>
-            <a:r>
-              <a:rPr lang="en-US" sz="4000" b="1" dirty="0" smtClean="0"/>
-              <a:t>mail</a:t>
-            </a:r>
-          </a:p>
-          <a:p>
-            <a:pPr marL="0" indent="0">
-              <a:buNone/>
-            </a:pPr>
-            <a:r>
-              <a:rPr lang="en-US" sz="4000" b="1" dirty="0" smtClean="0">
+              <a:rPr lang="en-US" sz="3800" b="1" dirty="0" smtClean="0">
                 <a:solidFill>
                   <a:srgbClr val="0000FF"/>
                 </a:solidFill>
@@ -25176,7 +25564,7 @@
               <a:t>604</a:t>
             </a:r>
             <a:r>
-              <a:rPr lang="en-US" sz="4000" b="1" dirty="0" smtClean="0">
+              <a:rPr lang="en-US" sz="3800" b="1" dirty="0" smtClean="0">
                 <a:solidFill>
                   <a:schemeClr val="accent1">
                     <a:lumMod val="50000"/>
@@ -25186,10 +25574,23 @@
                 <a:cs typeface="Courier New"/>
                 <a:hlinkClick r:id="rId2"/>
               </a:rPr>
-              <a:t>2-webmaster@csail.mit.ed</a:t>
-            </a:r>
-            <a:r>
-              <a:rPr lang="en-US" sz="4000" b="1" dirty="0" smtClean="0">
+              <a:t>2-s14-stellar@</a:t>
+            </a:r>
+            <a:r>
+              <a:rPr lang="en-US" sz="3800" b="1" dirty="0" smtClean="0">
+                <a:solidFill>
+                  <a:schemeClr val="accent1">
+                    <a:lumMod val="50000"/>
+                  </a:schemeClr>
+                </a:solidFill>
+                <a:latin typeface="Courier New"/>
+                <a:cs typeface="Courier New"/>
+                <a:hlinkClick r:id="rId2"/>
+              </a:rPr>
+              <a:t>csail.mit.ed</a:t>
+            </a:r>
+            <a:r>
+              <a:rPr lang="en-US" sz="3800" b="1" dirty="0" smtClean="0">
                 <a:solidFill>
                   <a:srgbClr val="0000FF"/>
                 </a:solidFill>
@@ -25199,7 +25600,7 @@
               </a:rPr>
               <a:t>u</a:t>
             </a:r>
-            <a:endParaRPr lang="en-US" sz="4000" b="1" dirty="0" smtClean="0">
+            <a:endParaRPr lang="en-US" sz="3800" b="1" dirty="0" smtClean="0">
               <a:solidFill>
                 <a:srgbClr val="0000FF"/>
               </a:solidFill>
@@ -25261,7 +25662,7 @@
   <p:clrMapOvr>
     <a:masterClrMapping/>
   </p:clrMapOvr>
-  <p:transition xmlns:p14="http://schemas.microsoft.com/office/powerpoint/2010/main" spd="slow">
+  <p:transition xmlns:p14="http://schemas.microsoft.com/office/powerpoint/2010/main" spd="slow" advClick="0">
     <p:fade/>
   </p:transition>
   <p:timing>
@@ -25568,7 +25969,7 @@
                             </p:stCondLst>
                             <p:childTnLst>
                               <p:par>
-                                <p:cTn id="5" presetID="1" presetClass="entr" presetSubtype="0" fill="hold" nodeType="clickEffect">
+                                <p:cTn id="5" presetID="9" presetClass="entr" presetSubtype="0" fill="hold" nodeType="clickEffect">
                                   <p:stCondLst>
                                     <p:cond delay="0"/>
                                   </p:stCondLst>
@@ -25595,6 +25996,18 @@
                                         <p:strVal val="visible"/>
                                       </p:to>
                                     </p:set>
+                                    <p:animEffect transition="in" filter="dissolve">
+                                      <p:cBhvr>
+                                        <p:cTn id="7" dur="500"/>
+                                        <p:tgtEl>
+                                          <p:spTgt spid="1033">
+                                            <p:txEl>
+                                              <p:pRg st="1" end="1"/>
+                                            </p:txEl>
+                                          </p:spTgt>
+                                        </p:tgtEl>
+                                      </p:cBhvr>
+                                    </p:animEffect>
                                   </p:childTnLst>
                                 </p:cTn>
                               </p:par>
@@ -25605,26 +26018,26 @@
                     </p:cTn>
                   </p:par>
                   <p:par>
-                    <p:cTn id="7" fill="hold">
+                    <p:cTn id="8" fill="hold">
                       <p:stCondLst>
                         <p:cond delay="indefinite"/>
                       </p:stCondLst>
                       <p:childTnLst>
                         <p:par>
-                          <p:cTn id="8" fill="hold">
+                          <p:cTn id="9" fill="hold">
                             <p:stCondLst>
                               <p:cond delay="0"/>
                             </p:stCondLst>
                             <p:childTnLst>
                               <p:par>
-                                <p:cTn id="9" presetID="1" presetClass="entr" presetSubtype="0" fill="hold" nodeType="clickEffect">
+                                <p:cTn id="10" presetID="9" presetClass="entr" presetSubtype="0" fill="hold" nodeType="clickEffect">
                                   <p:stCondLst>
                                     <p:cond delay="0"/>
                                   </p:stCondLst>
                                   <p:childTnLst>
                                     <p:set>
                                       <p:cBhvr>
-                                        <p:cTn id="10" dur="1" fill="hold">
+                                        <p:cTn id="11" dur="1" fill="hold">
                                           <p:stCondLst>
                                             <p:cond delay="0"/>
                                           </p:stCondLst>
@@ -25644,6 +26057,18 @@
                                         <p:strVal val="visible"/>
                                       </p:to>
                                     </p:set>
+                                    <p:animEffect transition="in" filter="dissolve">
+                                      <p:cBhvr>
+                                        <p:cTn id="12" dur="500"/>
+                                        <p:tgtEl>
+                                          <p:spTgt spid="1033">
+                                            <p:txEl>
+                                              <p:pRg st="2" end="2"/>
+                                            </p:txEl>
+                                          </p:spTgt>
+                                        </p:tgtEl>
+                                      </p:cBhvr>
+                                    </p:animEffect>
                                   </p:childTnLst>
                                 </p:cTn>
                               </p:par>
@@ -25962,7 +26387,7 @@
         <p:spPr bwMode="auto">
           <a:xfrm>
             <a:off x="84668" y="1532451"/>
-            <a:ext cx="8983133" cy="3785652"/>
+            <a:ext cx="8983133" cy="4524315"/>
           </a:xfrm>
           <a:prstGeom prst="rect">
             <a:avLst/>
@@ -26040,7 +26465,40 @@
               <a:rPr lang="en-US" sz="4800" dirty="0" smtClean="0">
                 <a:latin typeface="Comic Sans MS" pitchFamily="66" charset="0"/>
               </a:rPr>
-              <a:t> Text Chapter 1 for </a:t>
+              <a:t> Text Chapter </a:t>
+            </a:r>
+            <a:r>
+              <a:rPr lang="en-US" sz="4800" dirty="0" smtClean="0">
+                <a:latin typeface="Comic Sans MS" pitchFamily="66" charset="0"/>
+              </a:rPr>
+              <a:t>1, </a:t>
+            </a:r>
+            <a:r>
+              <a:rPr lang="en-US" sz="4800" dirty="0" smtClean="0">
+                <a:latin typeface="Comic Sans MS" pitchFamily="66" charset="0"/>
+              </a:rPr>
+              <a:t>slide </a:t>
+            </a:r>
+            <a:r>
+              <a:rPr lang="en-US" sz="4800" dirty="0">
+                <a:latin typeface="Comic Sans MS" pitchFamily="66" charset="0"/>
+              </a:rPr>
+              <a:t>video </a:t>
+            </a:r>
+            <a:r>
+              <a:rPr lang="en-US" sz="4800" dirty="0" smtClean="0">
+                <a:latin typeface="Comic Sans MS" pitchFamily="66" charset="0"/>
+              </a:rPr>
+              <a:t>  	</a:t>
+            </a:r>
+            <a:r>
+              <a:rPr lang="en-US" sz="4800" dirty="0" smtClean="0">
+                <a:solidFill>
+                  <a:srgbClr val="000000"/>
+                </a:solidFill>
+                <a:latin typeface="Comic Sans MS" pitchFamily="66" charset="0"/>
+              </a:rPr>
+              <a:t>for</a:t>
             </a:r>
             <a:r>
               <a:rPr lang="en-US" sz="4800" dirty="0" smtClean="0">
@@ -26049,8 +26507,85 @@
                 </a:solidFill>
                 <a:latin typeface="Comic Sans MS" pitchFamily="66" charset="0"/>
               </a:rPr>
-              <a:t>Friday</a:t>
-            </a:r>
+              <a:t> Friday</a:t>
+            </a:r>
+            <a:r>
+              <a:rPr lang="en-US" sz="4800" dirty="0" smtClean="0">
+                <a:solidFill>
+                  <a:srgbClr val="000000"/>
+                </a:solidFill>
+                <a:latin typeface="Comic Sans MS" pitchFamily="66" charset="0"/>
+              </a:rPr>
+              <a:t>.</a:t>
+            </a:r>
+          </a:p>
+          <a:p>
+            <a:pPr algn="l">
+              <a:defRPr/>
+            </a:pPr>
+            <a:r>
+              <a:rPr lang="en-US" sz="4800" dirty="0" smtClean="0">
+                <a:solidFill>
+                  <a:srgbClr val="000000"/>
+                </a:solidFill>
+                <a:latin typeface="Comic Sans MS" pitchFamily="66" charset="0"/>
+              </a:rPr>
+              <a:t>     </a:t>
+            </a:r>
+            <a:r>
+              <a:rPr lang="en-US" sz="4800" dirty="0">
+                <a:latin typeface="Comic Sans MS" pitchFamily="66" charset="0"/>
+              </a:rPr>
+              <a:t>F</a:t>
+            </a:r>
+            <a:r>
+              <a:rPr lang="en-US" sz="4800" dirty="0" smtClean="0">
+                <a:latin typeface="Comic Sans MS" pitchFamily="66" charset="0"/>
+              </a:rPr>
+              <a:t>or</a:t>
+            </a:r>
+            <a:r>
+              <a:rPr lang="en-US" sz="4800" dirty="0" smtClean="0">
+                <a:solidFill>
+                  <a:srgbClr val="0000FF"/>
+                </a:solidFill>
+                <a:latin typeface="Comic Sans MS" pitchFamily="66" charset="0"/>
+              </a:rPr>
+              <a:t> </a:t>
+            </a:r>
+            <a:r>
+              <a:rPr lang="en-US" sz="4800" dirty="0">
+                <a:solidFill>
+                  <a:srgbClr val="0000FF"/>
+                </a:solidFill>
+                <a:latin typeface="Comic Sans MS" pitchFamily="66" charset="0"/>
+              </a:rPr>
+              <a:t>next </a:t>
+            </a:r>
+            <a:r>
+              <a:rPr lang="en-US" sz="4800" dirty="0" smtClean="0">
+                <a:solidFill>
+                  <a:srgbClr val="0000FF"/>
+                </a:solidFill>
+                <a:latin typeface="Comic Sans MS" pitchFamily="66" charset="0"/>
+              </a:rPr>
+              <a:t>week:</a:t>
+            </a:r>
+            <a:r>
+              <a:rPr lang="en-US" sz="4800" dirty="0" smtClean="0">
+                <a:solidFill>
+                  <a:srgbClr val="000000"/>
+                </a:solidFill>
+                <a:latin typeface="Comic Sans MS" pitchFamily="66" charset="0"/>
+              </a:rPr>
+              <a:t> videos &amp;</a:t>
+            </a:r>
+            <a:endParaRPr lang="en-US" sz="4800" dirty="0" smtClean="0">
+              <a:solidFill>
+                <a:srgbClr val="0000FF"/>
+              </a:solidFill>
+              <a:latin typeface="Comic Sans MS" pitchFamily="66" charset="0"/>
+            </a:endParaRPr>
           </a:p>
           <a:p>
             <a:pPr algn="l">
@@ -26062,74 +26597,19 @@
               <a:rPr lang="en-US" sz="4800" dirty="0" smtClean="0">
                 <a:latin typeface="Comic Sans MS" pitchFamily="66" charset="0"/>
               </a:rPr>
-              <a:t>  slide </a:t>
+              <a:t> Ch. </a:t>
             </a:r>
             <a:r>
               <a:rPr lang="en-US" sz="4800" dirty="0">
                 <a:latin typeface="Comic Sans MS" pitchFamily="66" charset="0"/>
               </a:rPr>
-              <a:t>video </a:t>
-            </a:r>
-            <a:r>
-              <a:rPr lang="en-US" sz="4800" dirty="0">
-                <a:solidFill>
-                  <a:srgbClr val="0000FF"/>
-                </a:solidFill>
-                <a:latin typeface="Comic Sans MS" pitchFamily="66" charset="0"/>
-              </a:rPr>
-              <a:t>for </a:t>
-            </a:r>
-            <a:r>
-              <a:rPr lang="en-US" sz="4800" dirty="0" smtClean="0">
-                <a:solidFill>
-                  <a:srgbClr val="0000FF"/>
-                </a:solidFill>
-                <a:latin typeface="Comic Sans MS" pitchFamily="66" charset="0"/>
-              </a:rPr>
-              <a:t>Friday</a:t>
-            </a:r>
-          </a:p>
-          <a:p>
-            <a:pPr algn="l">
-              <a:buFont typeface="Arial" pitchFamily="34" charset="0"/>
-              <a:buChar char="•"/>
-              <a:defRPr/>
-            </a:pPr>
+              <a:t>2 </a:t>
+            </a:r>
             <a:r>
               <a:rPr lang="en-US" sz="4800" dirty="0" smtClean="0">
                 <a:latin typeface="Comic Sans MS" pitchFamily="66" charset="0"/>
               </a:rPr>
-              <a:t> Ch. </a:t>
-            </a:r>
-            <a:r>
-              <a:rPr lang="en-US" sz="4800" dirty="0">
-                <a:latin typeface="Comic Sans MS" pitchFamily="66" charset="0"/>
-              </a:rPr>
-              <a:t>2 for</a:t>
-            </a:r>
-            <a:r>
-              <a:rPr lang="en-US" sz="4800" dirty="0">
-                <a:solidFill>
-                  <a:schemeClr val="accent1">
-                    <a:lumMod val="50000"/>
-                  </a:schemeClr>
-                </a:solidFill>
-                <a:latin typeface="Comic Sans MS" pitchFamily="66" charset="0"/>
-              </a:rPr>
-              <a:t> Monday</a:t>
-            </a:r>
-          </a:p>
-          <a:p>
-            <a:pPr algn="l">
-              <a:buFont typeface="Arial"/>
-              <a:buChar char="•"/>
-              <a:defRPr/>
-            </a:pPr>
-            <a:r>
-              <a:rPr lang="en-US" sz="4800" dirty="0">
-                <a:latin typeface="Comic Sans MS" pitchFamily="66" charset="0"/>
-              </a:rPr>
-              <a:t> Ch. 3 for </a:t>
+              <a:t>parts for</a:t>
             </a:r>
             <a:r>
               <a:rPr lang="en-US" sz="4800" dirty="0" smtClean="0">
@@ -26140,7 +26620,54 @@
                 </a:solidFill>
                 <a:latin typeface="Comic Sans MS" pitchFamily="66" charset="0"/>
               </a:rPr>
-              <a:t>Wed, Fri next week</a:t>
+              <a:t> Monday</a:t>
+            </a:r>
+            <a:endParaRPr lang="en-US" sz="4800" dirty="0">
+              <a:solidFill>
+                <a:srgbClr val="000000"/>
+              </a:solidFill>
+              <a:latin typeface="Comic Sans MS" pitchFamily="66" charset="0"/>
+            </a:endParaRPr>
+          </a:p>
+          <a:p>
+            <a:pPr algn="l">
+              <a:buFont typeface="Arial"/>
+              <a:buChar char="•"/>
+              <a:defRPr/>
+            </a:pPr>
+            <a:r>
+              <a:rPr lang="en-US" sz="4800" dirty="0">
+                <a:latin typeface="Comic Sans MS" pitchFamily="66" charset="0"/>
+              </a:rPr>
+              <a:t> Ch. 3 </a:t>
+            </a:r>
+            <a:r>
+              <a:rPr lang="en-US" sz="4800" dirty="0" smtClean="0">
+                <a:latin typeface="Comic Sans MS" pitchFamily="66" charset="0"/>
+              </a:rPr>
+              <a:t>parts for </a:t>
+            </a:r>
+            <a:r>
+              <a:rPr lang="en-US" sz="4800" dirty="0" smtClean="0">
+                <a:solidFill>
+                  <a:schemeClr val="accent1">
+                    <a:lumMod val="50000"/>
+                  </a:schemeClr>
+                </a:solidFill>
+                <a:latin typeface="Comic Sans MS" pitchFamily="66" charset="0"/>
+              </a:rPr>
+              <a:t>Wed, </a:t>
+            </a:r>
+            <a:r>
+              <a:rPr lang="en-US" sz="4800" dirty="0" smtClean="0">
+                <a:solidFill>
+                  <a:schemeClr val="accent1">
+                    <a:lumMod val="50000"/>
+                  </a:schemeClr>
+                </a:solidFill>
+                <a:latin typeface="Comic Sans MS" pitchFamily="66" charset="0"/>
+              </a:rPr>
+              <a:t>Fri</a:t>
             </a:r>
             <a:endParaRPr lang="en-US" sz="4800" dirty="0">
               <a:latin typeface="Comic Sans MS" pitchFamily="66" charset="0"/>
@@ -26236,7 +26763,7 @@
           <a:graphicData uri="http://schemas.openxmlformats.org/presentationml/2006/ole">
             <mc:AlternateContent xmlns:mc="http://schemas.openxmlformats.org/markup-compatibility/2006">
               <mc:Choice xmlns:v="urn:schemas-microsoft-com:vml" Requires="v">
-                <p:oleObj spid="_x0000_s3167" name="Equation" r:id="rId4" imgW="914400" imgH="215640" progId="Equation.3">
+                <p:oleObj spid="_x0000_s3185" name="Equation" r:id="rId4" imgW="914400" imgH="215640" progId="Equation.3">
                   <p:embed/>
                 </p:oleObj>
               </mc:Choice>
@@ -26306,7 +26833,7 @@
           <a:graphicData uri="http://schemas.openxmlformats.org/presentationml/2006/ole">
             <mc:AlternateContent xmlns:mc="http://schemas.openxmlformats.org/markup-compatibility/2006">
               <mc:Choice xmlns:v="urn:schemas-microsoft-com:vml" Requires="v">
-                <p:oleObj spid="_x0000_s3168" name="Equation" r:id="rId6" imgW="914400" imgH="215640" progId="Equation.3">
+                <p:oleObj spid="_x0000_s3186" name="Equation" r:id="rId6" imgW="914400" imgH="215640" progId="Equation.3">
                   <p:embed/>
                 </p:oleObj>
               </mc:Choice>
@@ -26399,7 +26926,7 @@
   <p:clrMapOvr>
     <a:masterClrMapping/>
   </p:clrMapOvr>
-  <p:transition xmlns:p14="http://schemas.microsoft.com/office/powerpoint/2010/main" spd="slow">
+  <p:transition xmlns:p14="http://schemas.microsoft.com/office/powerpoint/2010/main" spd="slow" advClick="0">
     <p:fade thruBlk="1"/>
   </p:transition>
   <p:timing>
@@ -26529,30 +27056,21 @@
                             </p:childTnLst>
                           </p:cTn>
                         </p:par>
-                      </p:childTnLst>
-                    </p:cTn>
-                  </p:par>
-                  <p:par>
-                    <p:cTn id="13" fill="hold">
-                      <p:stCondLst>
-                        <p:cond delay="indefinite"/>
-                      </p:stCondLst>
-                      <p:childTnLst>
                         <p:par>
-                          <p:cTn id="14" fill="hold">
+                          <p:cTn id="13" fill="hold">
                             <p:stCondLst>
-                              <p:cond delay="0"/>
+                              <p:cond delay="500"/>
                             </p:stCondLst>
                             <p:childTnLst>
                               <p:par>
-                                <p:cTn id="15" presetID="9" presetClass="entr" presetSubtype="0" fill="hold" nodeType="clickEffect">
+                                <p:cTn id="14" presetID="9" presetClass="entr" presetSubtype="0" fill="hold" nodeType="afterEffect">
                                   <p:stCondLst>
                                     <p:cond delay="0"/>
                                   </p:stCondLst>
                                   <p:childTnLst>
                                     <p:set>
                                       <p:cBhvr>
-                                        <p:cTn id="16" dur="1" fill="hold">
+                                        <p:cTn id="15" dur="1" fill="hold">
                                           <p:stCondLst>
                                             <p:cond delay="0"/>
                                           </p:stCondLst>
@@ -26574,7 +27092,7 @@
                                     </p:set>
                                     <p:animEffect transition="in" filter="dissolve">
                                       <p:cBhvr>
-                                        <p:cTn id="17" dur="500"/>
+                                        <p:cTn id="16" dur="500"/>
                                         <p:tgtEl>
                                           <p:spTgt spid="3080">
                                             <p:txEl>
@@ -26590,30 +27108,21 @@
                             </p:childTnLst>
                           </p:cTn>
                         </p:par>
-                      </p:childTnLst>
-                    </p:cTn>
-                  </p:par>
-                  <p:par>
-                    <p:cTn id="18" fill="hold">
-                      <p:stCondLst>
-                        <p:cond delay="indefinite"/>
-                      </p:stCondLst>
-                      <p:childTnLst>
                         <p:par>
-                          <p:cTn id="19" fill="hold">
+                          <p:cTn id="17" fill="hold">
                             <p:stCondLst>
-                              <p:cond delay="0"/>
+                              <p:cond delay="1000"/>
                             </p:stCondLst>
                             <p:childTnLst>
                               <p:par>
-                                <p:cTn id="20" presetID="9" presetClass="entr" presetSubtype="0" fill="hold" nodeType="clickEffect">
+                                <p:cTn id="18" presetID="9" presetClass="entr" presetSubtype="0" fill="hold" nodeType="afterEffect">
                                   <p:stCondLst>
                                     <p:cond delay="0"/>
                                   </p:stCondLst>
                                   <p:childTnLst>
                                     <p:set>
                                       <p:cBhvr>
-                                        <p:cTn id="21" dur="1" fill="hold">
+                                        <p:cTn id="19" dur="1" fill="hold">
                                           <p:stCondLst>
                                             <p:cond delay="0"/>
                                           </p:stCondLst>
@@ -26635,7 +27144,7 @@
                                     </p:set>
                                     <p:animEffect transition="in" filter="dissolve">
                                       <p:cBhvr>
-                                        <p:cTn id="22" dur="500"/>
+                                        <p:cTn id="20" dur="500"/>
                                         <p:tgtEl>
                                           <p:spTgt spid="3080">
                                             <p:txEl>
@@ -26731,8 +27240,8 @@
         </p:nvSpPr>
         <p:spPr>
           <a:xfrm>
-            <a:off x="93137" y="1303864"/>
-            <a:ext cx="9050863" cy="5122335"/>
+            <a:off x="182037" y="1354665"/>
+            <a:ext cx="8758763" cy="4792136"/>
           </a:xfrm>
         </p:spPr>
         <p:txBody>
@@ -26742,12 +27251,11 @@
             <a:r>
               <a:rPr lang="en-US" sz="4000" dirty="0" smtClean="0">
                 <a:solidFill>
-                  <a:srgbClr val="FF6600"/>
+                  <a:srgbClr val="CB21DD"/>
                 </a:solidFill>
               </a:rPr>
               <a:t>required attendance</a:t>
             </a:r>
-            <a:endParaRPr lang="en-US" sz="4000" dirty="0" smtClean="0"/>
           </a:p>
           <a:p>
             <a:r>
@@ -26770,36 +27278,6 @@
                   <a:srgbClr val="0000FF"/>
                 </a:solidFill>
               </a:rPr>
-              <a:t>microquizzes</a:t>
-            </a:r>
-            <a:r>
-              <a:rPr lang="en-US" sz="4000" dirty="0" smtClean="0"/>
-              <a:t> </a:t>
-            </a:r>
-            <a:r>
-              <a:rPr lang="en-US" sz="4000" dirty="0"/>
-              <a:t>most </a:t>
-            </a:r>
-            <a:r>
-              <a:rPr lang="en-US" sz="4000" dirty="0" smtClean="0"/>
-              <a:t>Wed &amp; Fri 5 </a:t>
-            </a:r>
-            <a:r>
-              <a:rPr lang="en-US" sz="4000" dirty="0"/>
-              <a:t>min</a:t>
-            </a:r>
-            <a:r>
-              <a:rPr lang="en-US" sz="4000" dirty="0" smtClean="0"/>
-              <a:t>.</a:t>
-            </a:r>
-          </a:p>
-          <a:p>
-            <a:r>
-              <a:rPr lang="en-US" sz="4000" dirty="0" err="1" smtClean="0">
-                <a:solidFill>
-                  <a:srgbClr val="0000FF"/>
-                </a:solidFill>
-              </a:rPr>
               <a:t>psets</a:t>
             </a:r>
             <a:r>
@@ -26822,7 +27300,7 @@
                   <a:srgbClr val="0000FF"/>
                 </a:solidFill>
               </a:rPr>
-              <a:t>online</a:t>
+              <a:t>videos, online</a:t>
             </a:r>
             <a:r>
               <a:rPr lang="en-US" sz="4000" dirty="0" smtClean="0"/>
@@ -26840,7 +27318,11 @@
             </a:r>
             <a:r>
               <a:rPr lang="en-US" sz="4000" dirty="0" smtClean="0"/>
-              <a:t> due most days</a:t>
+              <a:t> </a:t>
+            </a:r>
+            <a:r>
+              <a:rPr lang="en-US" sz="4000" dirty="0" smtClean="0"/>
+              <a:t>most days</a:t>
             </a:r>
           </a:p>
           <a:p>
@@ -26850,15 +27332,23 @@
                   <a:srgbClr val="0000FF"/>
                 </a:solidFill>
               </a:rPr>
-              <a:t>2 midterms</a:t>
+              <a:t>3 </a:t>
+            </a:r>
+            <a:r>
+              <a:rPr lang="en-US" sz="4000" dirty="0" smtClean="0">
+                <a:solidFill>
+                  <a:srgbClr val="0000FF"/>
+                </a:solidFill>
+              </a:rPr>
+              <a:t>midterms</a:t>
             </a:r>
             <a:r>
               <a:rPr lang="en-US" sz="4000" dirty="0" smtClean="0"/>
-              <a:t>, 1 </a:t>
-            </a:r>
-            <a:r>
-              <a:rPr lang="en-US" sz="4000" dirty="0"/>
-              <a:t>hour </a:t>
+              <a:t>, </a:t>
+            </a:r>
+            <a:r>
+              <a:rPr lang="en-US" sz="4000" dirty="0" smtClean="0"/>
+              <a:t>80 min. </a:t>
             </a:r>
             <a:r>
               <a:rPr lang="en-US" sz="4000" dirty="0" smtClean="0"/>
@@ -26879,6 +27369,10 @@
               <a:t> in Piazza </a:t>
             </a:r>
             <a:r>
+              <a:rPr lang="en-US" sz="4000" dirty="0" smtClean="0"/>
+              <a:t>(</a:t>
+            </a:r>
+            <a:r>
               <a:rPr lang="en-US" sz="4000" dirty="0" smtClean="0">
                 <a:solidFill>
                   <a:srgbClr val="077F15"/>
@@ -26886,9 +27380,17 @@
               </a:rPr>
               <a:t>optional</a:t>
             </a:r>
+            <a:r>
+              <a:rPr lang="en-US" sz="4000" dirty="0" smtClean="0">
+                <a:solidFill>
+                  <a:srgbClr val="000000"/>
+                </a:solidFill>
+              </a:rPr>
+              <a:t>)</a:t>
+            </a:r>
             <a:endParaRPr lang="en-US" sz="4000" dirty="0">
               <a:solidFill>
-                <a:srgbClr val="077F15"/>
+                <a:srgbClr val="000000"/>
               </a:solidFill>
             </a:endParaRPr>
           </a:p>
@@ -26946,7 +27448,7 @@
   <p:clrMapOvr>
     <a:masterClrMapping/>
   </p:clrMapOvr>
-  <p:transition xmlns:p14="http://schemas.microsoft.com/office/powerpoint/2010/main" spd="slow">
+  <p:transition xmlns:p14="http://schemas.microsoft.com/office/powerpoint/2010/main" spd="slow" advClick="0">
     <p:fade/>
   </p:transition>
   <p:timing>
@@ -27309,67 +27811,6 @@
                                           <p:spTgt spid="3">
                                             <p:txEl>
                                               <p:pRg st="5" end="5"/>
-                                            </p:txEl>
-                                          </p:spTgt>
-                                        </p:tgtEl>
-                                      </p:cBhvr>
-                                    </p:animEffect>
-                                  </p:childTnLst>
-                                </p:cTn>
-                              </p:par>
-                            </p:childTnLst>
-                          </p:cTn>
-                        </p:par>
-                      </p:childTnLst>
-                    </p:cTn>
-                  </p:par>
-                  <p:par>
-                    <p:cTn id="33" fill="hold">
-                      <p:stCondLst>
-                        <p:cond delay="indefinite"/>
-                      </p:stCondLst>
-                      <p:childTnLst>
-                        <p:par>
-                          <p:cTn id="34" fill="hold">
-                            <p:stCondLst>
-                              <p:cond delay="0"/>
-                            </p:stCondLst>
-                            <p:childTnLst>
-                              <p:par>
-                                <p:cTn id="35" presetID="10" presetClass="entr" presetSubtype="0" fill="hold" grpId="0" nodeType="clickEffect">
-                                  <p:stCondLst>
-                                    <p:cond delay="0"/>
-                                  </p:stCondLst>
-                                  <p:childTnLst>
-                                    <p:set>
-                                      <p:cBhvr>
-                                        <p:cTn id="36" dur="1" fill="hold">
-                                          <p:stCondLst>
-                                            <p:cond delay="0"/>
-                                          </p:stCondLst>
-                                        </p:cTn>
-                                        <p:tgtEl>
-                                          <p:spTgt spid="3">
-                                            <p:txEl>
-                                              <p:pRg st="6" end="6"/>
-                                            </p:txEl>
-                                          </p:spTgt>
-                                        </p:tgtEl>
-                                        <p:attrNameLst>
-                                          <p:attrName>style.visibility</p:attrName>
-                                        </p:attrNameLst>
-                                      </p:cBhvr>
-                                      <p:to>
-                                        <p:strVal val="visible"/>
-                                      </p:to>
-                                    </p:set>
-                                    <p:animEffect transition="in" filter="fade">
-                                      <p:cBhvr>
-                                        <p:cTn id="37" dur="500"/>
-                                        <p:tgtEl>
-                                          <p:spTgt spid="3">
-                                            <p:txEl>
-                                              <p:pRg st="6" end="6"/>
                                             </p:txEl>
                                           </p:spTgt>
                                         </p:tgtEl>

</xml_diff>